<commit_message>
Finished remaking slides. Finished Project with Trump Tweets mined 12/6/16.
</commit_message>
<xml_diff>
--- a/CS262_Project_Presentation_Dennis_Hsu.pptx
+++ b/CS262_Project_Presentation_Dennis_Hsu.pptx
@@ -21,12 +21,16 @@
     <p:sldId id="276" r:id="rId15"/>
     <p:sldId id="265" r:id="rId16"/>
     <p:sldId id="269" r:id="rId17"/>
-    <p:sldId id="271" r:id="rId18"/>
-    <p:sldId id="277" r:id="rId19"/>
-    <p:sldId id="278" r:id="rId20"/>
-    <p:sldId id="263" r:id="rId21"/>
-    <p:sldId id="264" r:id="rId22"/>
-    <p:sldId id="266" r:id="rId23"/>
+    <p:sldId id="282" r:id="rId18"/>
+    <p:sldId id="271" r:id="rId19"/>
+    <p:sldId id="277" r:id="rId20"/>
+    <p:sldId id="278" r:id="rId21"/>
+    <p:sldId id="263" r:id="rId22"/>
+    <p:sldId id="279" r:id="rId23"/>
+    <p:sldId id="280" r:id="rId24"/>
+    <p:sldId id="281" r:id="rId25"/>
+    <p:sldId id="264" r:id="rId26"/>
+    <p:sldId id="266" r:id="rId27"/>
   </p:sldIdLst>
   <p:sldSz cx="12192000" cy="6858000"/>
   <p:notesSz cx="6858000" cy="9144000"/>
@@ -359,7 +363,7 @@
           <a:p>
             <a:fld id="{01DCA6AC-BA79-4B06-9597-FAD30F8A044A}" type="datetimeFigureOut">
               <a:rPr lang="en-US" smtClean="0"/>
-              <a:t>12/6/2016</a:t>
+              <a:t>12/8/2016</a:t>
             </a:fld>
             <a:endParaRPr lang="en-US"/>
           </a:p>
@@ -567,7 +571,7 @@
           <a:p>
             <a:fld id="{01DCA6AC-BA79-4B06-9597-FAD30F8A044A}" type="datetimeFigureOut">
               <a:rPr lang="en-US" smtClean="0"/>
-              <a:t>12/6/2016</a:t>
+              <a:t>12/8/2016</a:t>
             </a:fld>
             <a:endParaRPr lang="en-US"/>
           </a:p>
@@ -823,7 +827,7 @@
           <a:p>
             <a:fld id="{01DCA6AC-BA79-4B06-9597-FAD30F8A044A}" type="datetimeFigureOut">
               <a:rPr lang="en-US" smtClean="0"/>
-              <a:t>12/6/2016</a:t>
+              <a:t>12/8/2016</a:t>
             </a:fld>
             <a:endParaRPr lang="en-US"/>
           </a:p>
@@ -993,7 +997,7 @@
           <a:p>
             <a:fld id="{01DCA6AC-BA79-4B06-9597-FAD30F8A044A}" type="datetimeFigureOut">
               <a:rPr lang="en-US" smtClean="0"/>
-              <a:t>12/6/2016</a:t>
+              <a:t>12/8/2016</a:t>
             </a:fld>
             <a:endParaRPr lang="en-US"/>
           </a:p>
@@ -1336,7 +1340,7 @@
           <a:p>
             <a:fld id="{01DCA6AC-BA79-4B06-9597-FAD30F8A044A}" type="datetimeFigureOut">
               <a:rPr lang="en-US" smtClean="0"/>
-              <a:t>12/6/2016</a:t>
+              <a:t>12/8/2016</a:t>
             </a:fld>
             <a:endParaRPr lang="en-US"/>
           </a:p>
@@ -1611,7 +1615,7 @@
           <a:p>
             <a:fld id="{01DCA6AC-BA79-4B06-9597-FAD30F8A044A}" type="datetimeFigureOut">
               <a:rPr lang="en-US" smtClean="0"/>
-              <a:t>12/6/2016</a:t>
+              <a:t>12/8/2016</a:t>
             </a:fld>
             <a:endParaRPr lang="en-US"/>
           </a:p>
@@ -1990,7 +1994,7 @@
           <a:p>
             <a:fld id="{01DCA6AC-BA79-4B06-9597-FAD30F8A044A}" type="datetimeFigureOut">
               <a:rPr lang="en-US" smtClean="0"/>
-              <a:t>12/6/2016</a:t>
+              <a:t>12/8/2016</a:t>
             </a:fld>
             <a:endParaRPr lang="en-US"/>
           </a:p>
@@ -2108,7 +2112,7 @@
           <a:p>
             <a:fld id="{01DCA6AC-BA79-4B06-9597-FAD30F8A044A}" type="datetimeFigureOut">
               <a:rPr lang="en-US" smtClean="0"/>
-              <a:t>12/6/2016</a:t>
+              <a:t>12/8/2016</a:t>
             </a:fld>
             <a:endParaRPr lang="en-US"/>
           </a:p>
@@ -2279,7 +2283,7 @@
           <a:p>
             <a:fld id="{01DCA6AC-BA79-4B06-9597-FAD30F8A044A}" type="datetimeFigureOut">
               <a:rPr lang="en-US" smtClean="0"/>
-              <a:t>12/6/2016</a:t>
+              <a:t>12/8/2016</a:t>
             </a:fld>
             <a:endParaRPr lang="en-US"/>
           </a:p>
@@ -2633,7 +2637,7 @@
           <a:p>
             <a:fld id="{01DCA6AC-BA79-4B06-9597-FAD30F8A044A}" type="datetimeFigureOut">
               <a:rPr lang="en-US" smtClean="0"/>
-              <a:t>12/6/2016</a:t>
+              <a:t>12/8/2016</a:t>
             </a:fld>
             <a:endParaRPr lang="en-US"/>
           </a:p>
@@ -3010,7 +3014,7 @@
           <a:p>
             <a:fld id="{01DCA6AC-BA79-4B06-9597-FAD30F8A044A}" type="datetimeFigureOut">
               <a:rPr lang="en-US" smtClean="0"/>
-              <a:t>12/6/2016</a:t>
+              <a:t>12/8/2016</a:t>
             </a:fld>
             <a:endParaRPr lang="en-US"/>
           </a:p>
@@ -3297,7 +3301,7 @@
           <a:p>
             <a:fld id="{01DCA6AC-BA79-4B06-9597-FAD30F8A044A}" type="datetimeFigureOut">
               <a:rPr lang="en-US" smtClean="0"/>
-              <a:t>12/6/2016</a:t>
+              <a:t>12/8/2016</a:t>
             </a:fld>
             <a:endParaRPr lang="en-US"/>
           </a:p>
@@ -5061,7 +5065,7 @@
         <p:spPr/>
         <p:txBody>
           <a:bodyPr>
-            <a:normAutofit/>
+            <a:normAutofit fontScale="92500" lnSpcReduction="10000"/>
           </a:bodyPr>
           <a:lstStyle/>
           <a:p>
@@ -5091,7 +5095,15 @@
             </a:pPr>
             <a:r>
               <a:rPr lang="en-US" dirty="0"/>
-              <a:t>Gaussian Naïve Bayes</a:t>
+              <a:t>Gaussian Naïve Bayes(</a:t>
+            </a:r>
+            <a:r>
+              <a:rPr lang="en-US" dirty="0" err="1"/>
+              <a:t>gnb</a:t>
+            </a:r>
+            <a:r>
+              <a:rPr lang="en-US" dirty="0"/>
+              <a:t>)</a:t>
             </a:r>
           </a:p>
           <a:p>
@@ -5101,7 +5113,7 @@
             </a:pPr>
             <a:r>
               <a:rPr lang="en-US" dirty="0"/>
-              <a:t>Support Vector Classifier</a:t>
+              <a:t>Support Vector Classifier(svc)</a:t>
             </a:r>
           </a:p>
           <a:p>
@@ -5111,7 +5123,15 @@
             </a:pPr>
             <a:r>
               <a:rPr lang="en-US" dirty="0"/>
-              <a:t>Logistic Regression</a:t>
+              <a:t>Logistic Regression(</a:t>
+            </a:r>
+            <a:r>
+              <a:rPr lang="en-US" dirty="0" err="1"/>
+              <a:t>lgr</a:t>
+            </a:r>
+            <a:r>
+              <a:rPr lang="en-US" dirty="0"/>
+              <a:t>)</a:t>
             </a:r>
           </a:p>
           <a:p>
@@ -5121,7 +5141,15 @@
             </a:pPr>
             <a:r>
               <a:rPr lang="en-US" dirty="0"/>
-              <a:t>k-Nearest Neighbors</a:t>
+              <a:t>k-Nearest Neighbors(</a:t>
+            </a:r>
+            <a:r>
+              <a:rPr lang="en-US" dirty="0" err="1"/>
+              <a:t>knn</a:t>
+            </a:r>
+            <a:r>
+              <a:rPr lang="en-US" dirty="0"/>
+              <a:t>)</a:t>
             </a:r>
           </a:p>
           <a:p>
@@ -5131,7 +5159,15 @@
             </a:pPr>
             <a:r>
               <a:rPr lang="en-US" dirty="0"/>
-              <a:t>Decision Tree</a:t>
+              <a:t>Decision Tree(</a:t>
+            </a:r>
+            <a:r>
+              <a:rPr lang="en-US" dirty="0" err="1"/>
+              <a:t>dtc</a:t>
+            </a:r>
+            <a:r>
+              <a:rPr lang="en-US" dirty="0"/>
+              <a:t>)</a:t>
             </a:r>
           </a:p>
           <a:p>
@@ -5141,7 +5177,15 @@
             </a:pPr>
             <a:r>
               <a:rPr lang="en-US" dirty="0"/>
-              <a:t>Stochastic Gradient Descent</a:t>
+              <a:t>Stochastic Gradient Descent(</a:t>
+            </a:r>
+            <a:r>
+              <a:rPr lang="en-US" dirty="0" err="1"/>
+              <a:t>sgd</a:t>
+            </a:r>
+            <a:r>
+              <a:rPr lang="en-US" dirty="0"/>
+              <a:t>)</a:t>
             </a:r>
           </a:p>
           <a:p>
@@ -5151,7 +5195,15 @@
             </a:pPr>
             <a:r>
               <a:rPr lang="en-US" dirty="0"/>
-              <a:t>Random Forest Classifier</a:t>
+              <a:t>Random Forest Classifier(</a:t>
+            </a:r>
+            <a:r>
+              <a:rPr lang="en-US" dirty="0" err="1"/>
+              <a:t>rfc</a:t>
+            </a:r>
+            <a:r>
+              <a:rPr lang="en-US" dirty="0"/>
+              <a:t>)</a:t>
             </a:r>
           </a:p>
           <a:p>
@@ -5169,7 +5221,43 @@
             </a:r>
             <a:r>
               <a:rPr lang="en-US" dirty="0"/>
+              <a:t>)—(soft </a:t>
+            </a:r>
+            <a:r>
+              <a:rPr lang="en-US" dirty="0" err="1"/>
+              <a:t>voc</a:t>
+            </a:r>
+            <a:r>
+              <a:rPr lang="en-US" dirty="0"/>
+              <a:t>, hard </a:t>
+            </a:r>
+            <a:r>
+              <a:rPr lang="en-US" dirty="0" err="1"/>
+              <a:t>voc</a:t>
+            </a:r>
+            <a:r>
+              <a:rPr lang="en-US" dirty="0"/>
               <a:t>)</a:t>
+            </a:r>
+          </a:p>
+          <a:p>
+            <a:pPr lvl="2">
+              <a:buFont typeface="Wingdings" panose="05000000000000000000" pitchFamily="2" charset="2"/>
+              <a:buChar char="§"/>
+            </a:pPr>
+            <a:r>
+              <a:rPr lang="en-US" dirty="0"/>
+              <a:t>Hard: majority vote</a:t>
+            </a:r>
+          </a:p>
+          <a:p>
+            <a:pPr lvl="2">
+              <a:buFont typeface="Wingdings" panose="05000000000000000000" pitchFamily="2" charset="2"/>
+              <a:buChar char="§"/>
+            </a:pPr>
+            <a:r>
+              <a:rPr lang="en-US" dirty="0"/>
+              <a:t>Soft: weighted probabilities of the vote</a:t>
             </a:r>
           </a:p>
           <a:p>
@@ -5231,76 +5319,44 @@
           <a:p>
             <a:r>
               <a:rPr lang="en-US" dirty="0"/>
-              <a:t>Implementation—</a:t>
-            </a:r>
-            <a:r>
-              <a:rPr lang="en-US" dirty="0" err="1"/>
-              <a:t>Resevoir</a:t>
-            </a:r>
-            <a:r>
-              <a:rPr lang="en-US" dirty="0"/>
-              <a:t> Sample</a:t>
-            </a:r>
-          </a:p>
-        </p:txBody>
-      </p:sp>
-      <p:sp>
-        <p:nvSpPr>
-          <p:cNvPr id="3" name="Content Placeholder 2"/>
-          <p:cNvSpPr>
-            <a:spLocks noGrp="1"/>
-          </p:cNvSpPr>
+              <a:t>Ensemble Classifier</a:t>
+            </a:r>
+          </a:p>
+        </p:txBody>
+      </p:sp>
+      <p:pic>
+        <p:nvPicPr>
+          <p:cNvPr id="4" name="Content Placeholder 3"/>
+          <p:cNvPicPr>
+            <a:picLocks noGrp="1" noChangeAspect="1"/>
+          </p:cNvPicPr>
           <p:nvPr>
             <p:ph idx="1"/>
           </p:nvPr>
-        </p:nvSpPr>
-        <p:spPr/>
-        <p:txBody>
-          <a:bodyPr/>
-          <a:lstStyle/>
-          <a:p>
-            <a:pPr>
-              <a:buFont typeface="Wingdings" panose="05000000000000000000" pitchFamily="2" charset="2"/>
-              <a:buChar char="§"/>
-            </a:pPr>
-            <a:r>
-              <a:rPr lang="en-US" dirty="0"/>
-              <a:t>Size of all tweets: 10,000</a:t>
-            </a:r>
-          </a:p>
-          <a:p>
-            <a:pPr>
-              <a:buFont typeface="Wingdings" panose="05000000000000000000" pitchFamily="2" charset="2"/>
-              <a:buChar char="§"/>
-            </a:pPr>
-            <a:r>
-              <a:rPr lang="en-US" dirty="0"/>
-              <a:t>Size of Reservoir Sample: 1,000</a:t>
-            </a:r>
-          </a:p>
-          <a:p>
-            <a:pPr>
-              <a:buFont typeface="Wingdings" panose="05000000000000000000" pitchFamily="2" charset="2"/>
-              <a:buChar char="§"/>
-            </a:pPr>
-            <a:r>
-              <a:rPr lang="en-US" dirty="0"/>
-              <a:t>Based on the algorithm in one of the previous slides, implementation was done</a:t>
-            </a:r>
-          </a:p>
-          <a:p>
-            <a:pPr>
-              <a:buFont typeface="Wingdings" panose="05000000000000000000" pitchFamily="2" charset="2"/>
-              <a:buChar char="§"/>
-            </a:pPr>
-            <a:endParaRPr lang="en-US" dirty="0"/>
-          </a:p>
-        </p:txBody>
-      </p:sp>
+        </p:nvPicPr>
+        <p:blipFill>
+          <a:blip r:embed="rId2">
+            <a:extLst>
+              <a:ext uri="{28A0092B-C50C-407E-A947-70E740481C1C}">
+                <a14:useLocalDpi xmlns:a14="http://schemas.microsoft.com/office/drawing/2010/main" val="0"/>
+              </a:ext>
+            </a:extLst>
+          </a:blip>
+          <a:stretch>
+            <a:fillRect/>
+          </a:stretch>
+        </p:blipFill>
+        <p:spPr>
+          <a:xfrm>
+            <a:off x="2878040" y="1846263"/>
+            <a:ext cx="6496245" cy="4022725"/>
+          </a:xfrm>
+        </p:spPr>
+      </p:pic>
     </p:spTree>
     <p:extLst>
       <p:ext uri="{BB962C8B-B14F-4D97-AF65-F5344CB8AC3E}">
-        <p14:creationId xmlns:p14="http://schemas.microsoft.com/office/powerpoint/2010/main" val="2202450574"/>
+        <p14:creationId xmlns:p14="http://schemas.microsoft.com/office/powerpoint/2010/main" val="2564259316"/>
       </p:ext>
     </p:extLst>
   </p:cSld>
@@ -5344,7 +5400,15 @@
           <a:p>
             <a:r>
               <a:rPr lang="en-US" dirty="0"/>
-              <a:t>Experiment Results—Old</a:t>
+              <a:t>Implementation—</a:t>
+            </a:r>
+            <a:r>
+              <a:rPr lang="en-US" dirty="0" err="1"/>
+              <a:t>Resevoir</a:t>
+            </a:r>
+            <a:r>
+              <a:rPr lang="en-US" dirty="0"/>
+              <a:t> Sample</a:t>
             </a:r>
           </a:p>
         </p:txBody>
@@ -5371,16 +5435,8 @@
               <a:buChar char="§"/>
             </a:pPr>
             <a:r>
-              <a:rPr lang="en-US" b="1" u="sng" dirty="0"/>
-              <a:t>Stolen Laptop: Lost </a:t>
-            </a:r>
-            <a:r>
-              <a:rPr lang="en-US" b="1" u="sng" dirty="0" err="1"/>
-              <a:t>dataset,results</a:t>
-            </a:r>
-            <a:r>
-              <a:rPr lang="en-US" b="1" u="sng" dirty="0"/>
-              <a:t>, graphs, tweets of Hillary Clinton and Donald Trump from Election Days</a:t>
+              <a:rPr lang="en-US" dirty="0"/>
+              <a:t>Size of all tweets: 10,000</a:t>
             </a:r>
           </a:p>
           <a:p>
@@ -5390,7 +5446,7 @@
             </a:pPr>
             <a:r>
               <a:rPr lang="en-US" dirty="0"/>
-              <a:t>Data below was from what I remembered and presentation</a:t>
+              <a:t>Size of Reservoir Sample: 1,000</a:t>
             </a:r>
           </a:p>
           <a:p>
@@ -5400,7 +5456,7 @@
             </a:pPr>
             <a:r>
               <a:rPr lang="en-US" dirty="0"/>
-              <a:t>Testing of smaller sample used to classify: Hillary Clinton</a:t>
+              <a:t>Based on the algorithm in one of the previous slides, implementation was done</a:t>
             </a:r>
           </a:p>
           <a:p>
@@ -5410,7 +5466,7 @@
             </a:pPr>
             <a:r>
               <a:rPr lang="en-US" dirty="0"/>
-              <a:t>402 tweets: best classifier was Ensemble Classifier(~71-72%)</a:t>
+              <a:t>Loaded first 1000 tweets (if count &lt; 1000)</a:t>
             </a:r>
           </a:p>
           <a:p>
@@ -5420,8 +5476,159 @@
             </a:pPr>
             <a:r>
               <a:rPr lang="en-US" dirty="0"/>
-              <a:t>200 tweets: best classifier was SVC(~71%)</a:t>
-            </a:r>
+              <a:t>Picked random number</a:t>
+            </a:r>
+          </a:p>
+          <a:p>
+            <a:pPr lvl="1">
+              <a:buFont typeface="Wingdings" panose="05000000000000000000" pitchFamily="2" charset="2"/>
+              <a:buChar char="§"/>
+            </a:pPr>
+            <a:r>
+              <a:rPr lang="en-US" dirty="0"/>
+              <a:t>If random number is less than or equal to 999, do replacement</a:t>
+            </a:r>
+          </a:p>
+          <a:p>
+            <a:pPr marL="201168" lvl="1" indent="0">
+              <a:buNone/>
+            </a:pPr>
+            <a:r>
+              <a:rPr lang="en-US" altLang="en-US" dirty="0">
+                <a:solidFill>
+                  <a:srgbClr val="000000"/>
+                </a:solidFill>
+                <a:latin typeface="Courier New" panose="02070309020205020404" pitchFamily="49" charset="0"/>
+                <a:cs typeface="Courier New" panose="02070309020205020404" pitchFamily="49" charset="0"/>
+              </a:rPr>
+              <a:t>r = </a:t>
+            </a:r>
+            <a:r>
+              <a:rPr lang="en-US" altLang="en-US" dirty="0" err="1">
+                <a:solidFill>
+                  <a:srgbClr val="000000"/>
+                </a:solidFill>
+                <a:latin typeface="Courier New" panose="02070309020205020404" pitchFamily="49" charset="0"/>
+                <a:cs typeface="Courier New" panose="02070309020205020404" pitchFamily="49" charset="0"/>
+              </a:rPr>
+              <a:t>random.randint</a:t>
+            </a:r>
+            <a:r>
+              <a:rPr lang="en-US" altLang="en-US" dirty="0">
+                <a:solidFill>
+                  <a:srgbClr val="000000"/>
+                </a:solidFill>
+                <a:latin typeface="Courier New" panose="02070309020205020404" pitchFamily="49" charset="0"/>
+                <a:cs typeface="Courier New" panose="02070309020205020404" pitchFamily="49" charset="0"/>
+              </a:rPr>
+              <a:t>(</a:t>
+            </a:r>
+            <a:r>
+              <a:rPr lang="en-US" altLang="en-US" dirty="0">
+                <a:solidFill>
+                  <a:srgbClr val="0000FF"/>
+                </a:solidFill>
+                <a:latin typeface="Courier New" panose="02070309020205020404" pitchFamily="49" charset="0"/>
+                <a:cs typeface="Courier New" panose="02070309020205020404" pitchFamily="49" charset="0"/>
+              </a:rPr>
+              <a:t>0</a:t>
+            </a:r>
+            <a:r>
+              <a:rPr lang="en-US" altLang="en-US" dirty="0">
+                <a:solidFill>
+                  <a:srgbClr val="000000"/>
+                </a:solidFill>
+                <a:latin typeface="Courier New" panose="02070309020205020404" pitchFamily="49" charset="0"/>
+                <a:cs typeface="Courier New" panose="02070309020205020404" pitchFamily="49" charset="0"/>
+              </a:rPr>
+              <a:t>, count)</a:t>
+            </a:r>
+            <a:br>
+              <a:rPr lang="en-US" altLang="en-US" dirty="0">
+                <a:solidFill>
+                  <a:srgbClr val="000000"/>
+                </a:solidFill>
+                <a:latin typeface="Courier New" panose="02070309020205020404" pitchFamily="49" charset="0"/>
+                <a:cs typeface="Courier New" panose="02070309020205020404" pitchFamily="49" charset="0"/>
+              </a:rPr>
+            </a:br>
+            <a:r>
+              <a:rPr lang="en-US" altLang="en-US" b="1" dirty="0">
+                <a:solidFill>
+                  <a:srgbClr val="000080"/>
+                </a:solidFill>
+                <a:latin typeface="Courier New" panose="02070309020205020404" pitchFamily="49" charset="0"/>
+                <a:cs typeface="Courier New" panose="02070309020205020404" pitchFamily="49" charset="0"/>
+              </a:rPr>
+              <a:t>if </a:t>
+            </a:r>
+            <a:r>
+              <a:rPr lang="en-US" altLang="en-US" dirty="0">
+                <a:solidFill>
+                  <a:srgbClr val="000000"/>
+                </a:solidFill>
+                <a:latin typeface="Courier New" panose="02070309020205020404" pitchFamily="49" charset="0"/>
+                <a:cs typeface="Courier New" panose="02070309020205020404" pitchFamily="49" charset="0"/>
+              </a:rPr>
+              <a:t>r &lt; </a:t>
+            </a:r>
+            <a:r>
+              <a:rPr lang="en-US" altLang="en-US" dirty="0">
+                <a:solidFill>
+                  <a:srgbClr val="0000FF"/>
+                </a:solidFill>
+                <a:latin typeface="Courier New" panose="02070309020205020404" pitchFamily="49" charset="0"/>
+                <a:cs typeface="Courier New" panose="02070309020205020404" pitchFamily="49" charset="0"/>
+              </a:rPr>
+              <a:t>999</a:t>
+            </a:r>
+            <a:r>
+              <a:rPr lang="en-US" altLang="en-US" dirty="0">
+                <a:solidFill>
+                  <a:srgbClr val="000000"/>
+                </a:solidFill>
+                <a:latin typeface="Courier New" panose="02070309020205020404" pitchFamily="49" charset="0"/>
+                <a:cs typeface="Courier New" panose="02070309020205020404" pitchFamily="49" charset="0"/>
+              </a:rPr>
+              <a:t>:</a:t>
+            </a:r>
+            <a:br>
+              <a:rPr lang="en-US" altLang="en-US" dirty="0">
+                <a:solidFill>
+                  <a:srgbClr val="000000"/>
+                </a:solidFill>
+                <a:latin typeface="Courier New" panose="02070309020205020404" pitchFamily="49" charset="0"/>
+                <a:cs typeface="Courier New" panose="02070309020205020404" pitchFamily="49" charset="0"/>
+              </a:rPr>
+            </a:br>
+            <a:r>
+              <a:rPr lang="en-US" altLang="en-US" dirty="0">
+                <a:solidFill>
+                  <a:srgbClr val="000000"/>
+                </a:solidFill>
+                <a:latin typeface="Courier New" panose="02070309020205020404" pitchFamily="49" charset="0"/>
+                <a:cs typeface="Courier New" panose="02070309020205020404" pitchFamily="49" charset="0"/>
+              </a:rPr>
+              <a:t>    </a:t>
+            </a:r>
+            <a:r>
+              <a:rPr lang="en-US" altLang="en-US" i="1" dirty="0">
+                <a:solidFill>
+                  <a:srgbClr val="808080"/>
+                </a:solidFill>
+                <a:latin typeface="Courier New" panose="02070309020205020404" pitchFamily="49" charset="0"/>
+                <a:cs typeface="Courier New" panose="02070309020205020404" pitchFamily="49" charset="0"/>
+              </a:rPr>
+              <a:t>#do prediction and replacement</a:t>
+            </a:r>
+            <a:endParaRPr lang="en-US" dirty="0"/>
+          </a:p>
+          <a:p>
+            <a:pPr lvl="1">
+              <a:buFont typeface="Wingdings" panose="05000000000000000000" pitchFamily="2" charset="2"/>
+              <a:buChar char="§"/>
+            </a:pPr>
+            <a:endParaRPr lang="en-US" dirty="0"/>
           </a:p>
           <a:p>
             <a:pPr>
@@ -5430,45 +5637,29 @@
             </a:pPr>
             <a:r>
               <a:rPr lang="en-US" dirty="0"/>
-              <a:t>Testing of smaller sample kept: Hillary Clinton</a:t>
-            </a:r>
-          </a:p>
-          <a:p>
-            <a:pPr lvl="1">
-              <a:buFont typeface="Wingdings" panose="05000000000000000000" pitchFamily="2" charset="2"/>
-              <a:buChar char="§"/>
-            </a:pPr>
-            <a:r>
-              <a:rPr lang="en-US" dirty="0"/>
-              <a:t>From what I remember, Hillary had an approval rating of around 42% with full 10,000 tweets</a:t>
-            </a:r>
-          </a:p>
-          <a:p>
-            <a:pPr lvl="1">
-              <a:buFont typeface="Wingdings" panose="05000000000000000000" pitchFamily="2" charset="2"/>
-              <a:buChar char="§"/>
-            </a:pPr>
-            <a:r>
-              <a:rPr lang="en-US" dirty="0"/>
-              <a:t>Random Smaller Sample of 1000: approval rating varied above and below the full set, but error average was 1.8%</a:t>
-            </a:r>
-          </a:p>
-          <a:p>
-            <a:pPr lvl="1">
-              <a:buFont typeface="Wingdings" panose="05000000000000000000" pitchFamily="2" charset="2"/>
-              <a:buChar char="§"/>
-            </a:pPr>
-            <a:r>
-              <a:rPr lang="en-US" dirty="0"/>
-              <a:t>Reservoir Sampling of 1000: approval rating was below the full 10,000 tweets, but only by average error rate of 1.2%</a:t>
-            </a:r>
+              <a:t>Compared with taking a random sample of 1000 from all tweets so far each time a new tweet comes in</a:t>
+            </a:r>
+          </a:p>
+          <a:p>
+            <a:pPr lvl="2">
+              <a:buFont typeface="Wingdings" panose="05000000000000000000" pitchFamily="2" charset="2"/>
+              <a:buChar char="§"/>
+            </a:pPr>
+            <a:endParaRPr lang="en-US" dirty="0"/>
+          </a:p>
+          <a:p>
+            <a:pPr>
+              <a:buFont typeface="Wingdings" panose="05000000000000000000" pitchFamily="2" charset="2"/>
+              <a:buChar char="§"/>
+            </a:pPr>
+            <a:endParaRPr lang="en-US" dirty="0"/>
           </a:p>
         </p:txBody>
       </p:sp>
     </p:spTree>
     <p:extLst>
       <p:ext uri="{BB962C8B-B14F-4D97-AF65-F5344CB8AC3E}">
-        <p14:creationId xmlns:p14="http://schemas.microsoft.com/office/powerpoint/2010/main" val="3829973443"/>
+        <p14:creationId xmlns:p14="http://schemas.microsoft.com/office/powerpoint/2010/main" val="2202450574"/>
       </p:ext>
     </p:extLst>
   </p:cSld>
@@ -5512,7 +5703,7 @@
           <a:p>
             <a:r>
               <a:rPr lang="en-US" dirty="0"/>
-              <a:t>Experiment Results—New</a:t>
+              <a:t>Experiment Results—Old</a:t>
             </a:r>
           </a:p>
         </p:txBody>
@@ -5529,7 +5720,9 @@
         </p:nvSpPr>
         <p:spPr/>
         <p:txBody>
-          <a:bodyPr/>
+          <a:bodyPr>
+            <a:normAutofit lnSpcReduction="10000"/>
+          </a:bodyPr>
           <a:lstStyle/>
           <a:p>
             <a:pPr>
@@ -5537,8 +5730,16 @@
               <a:buChar char="§"/>
             </a:pPr>
             <a:r>
-              <a:rPr lang="en-US" dirty="0"/>
-              <a:t>(In Progress)</a:t>
+              <a:rPr lang="en-US" b="1" u="sng" dirty="0"/>
+              <a:t>Stolen Laptop: Lost </a:t>
+            </a:r>
+            <a:r>
+              <a:rPr lang="en-US" b="1" u="sng" dirty="0" err="1"/>
+              <a:t>dataset,results</a:t>
+            </a:r>
+            <a:r>
+              <a:rPr lang="en-US" b="1" u="sng" dirty="0"/>
+              <a:t>, graphs, tweets of Hillary Clinton and Donald Trump from Election Days</a:t>
             </a:r>
           </a:p>
           <a:p>
@@ -5547,16 +5748,8 @@
               <a:buChar char="§"/>
             </a:pPr>
             <a:r>
-              <a:rPr lang="en-US" b="1" u="sng" dirty="0"/>
-              <a:t>Update: Since laptop was stolen, I have re-mined tweets again this time focusing on Donald Trump (Tweets from Dec. 6</a:t>
-            </a:r>
-            <a:r>
-              <a:rPr lang="en-US" b="1" u="sng" baseline="30000" dirty="0"/>
-              <a:t>th</a:t>
-            </a:r>
-            <a:r>
-              <a:rPr lang="en-US" b="1" u="sng" dirty="0"/>
-              <a:t>) and his current support</a:t>
+              <a:rPr lang="en-US" dirty="0"/>
+              <a:t>Data below was from what I remembered and presentation</a:t>
             </a:r>
           </a:p>
           <a:p>
@@ -5566,15 +5759,27 @@
             </a:pPr>
             <a:r>
               <a:rPr lang="en-US" dirty="0"/>
-              <a:t>Have begun recoding the pipeline and hopefully finish—will backup code to </a:t>
-            </a:r>
-            <a:r>
-              <a:rPr lang="en-US" dirty="0" err="1"/>
-              <a:t>github</a:t>
-            </a:r>
-            <a:r>
-              <a:rPr lang="en-US" dirty="0"/>
-              <a:t> this time around</a:t>
+              <a:t>Testing of smaller sample used to classify: Hillary Clinton</a:t>
+            </a:r>
+          </a:p>
+          <a:p>
+            <a:pPr lvl="1">
+              <a:buFont typeface="Wingdings" panose="05000000000000000000" pitchFamily="2" charset="2"/>
+              <a:buChar char="§"/>
+            </a:pPr>
+            <a:r>
+              <a:rPr lang="en-US" dirty="0"/>
+              <a:t>402 tweets: best classifier was Ensemble Classifier(~71-72%)</a:t>
+            </a:r>
+          </a:p>
+          <a:p>
+            <a:pPr lvl="1">
+              <a:buFont typeface="Wingdings" panose="05000000000000000000" pitchFamily="2" charset="2"/>
+              <a:buChar char="§"/>
+            </a:pPr>
+            <a:r>
+              <a:rPr lang="en-US" dirty="0"/>
+              <a:t>200 tweets: best classifier was SVC(~71%)</a:t>
             </a:r>
           </a:p>
           <a:p>
@@ -5584,22 +5789,45 @@
             </a:pPr>
             <a:r>
               <a:rPr lang="en-US" dirty="0"/>
-              <a:t>Will update with results hopefully by Wednesday when it’s due with graphs</a:t>
-            </a:r>
-          </a:p>
-          <a:p>
-            <a:pPr>
-              <a:buFont typeface="Wingdings" panose="05000000000000000000" pitchFamily="2" charset="2"/>
-              <a:buChar char="§"/>
-            </a:pPr>
-            <a:endParaRPr lang="en-US" dirty="0"/>
+              <a:t>Testing of smaller sample kept: Hillary Clinton</a:t>
+            </a:r>
+          </a:p>
+          <a:p>
+            <a:pPr lvl="1">
+              <a:buFont typeface="Wingdings" panose="05000000000000000000" pitchFamily="2" charset="2"/>
+              <a:buChar char="§"/>
+            </a:pPr>
+            <a:r>
+              <a:rPr lang="en-US" dirty="0"/>
+              <a:t>From what I remember, Hillary had an approval rating of around 42% with full 10,000 tweets</a:t>
+            </a:r>
+          </a:p>
+          <a:p>
+            <a:pPr lvl="1">
+              <a:buFont typeface="Wingdings" panose="05000000000000000000" pitchFamily="2" charset="2"/>
+              <a:buChar char="§"/>
+            </a:pPr>
+            <a:r>
+              <a:rPr lang="en-US" dirty="0"/>
+              <a:t>Random Smaller Sample of 1000: approval rating varied above and below the full set, but error average was 1.8%</a:t>
+            </a:r>
+          </a:p>
+          <a:p>
+            <a:pPr lvl="1">
+              <a:buFont typeface="Wingdings" panose="05000000000000000000" pitchFamily="2" charset="2"/>
+              <a:buChar char="§"/>
+            </a:pPr>
+            <a:r>
+              <a:rPr lang="en-US" dirty="0"/>
+              <a:t>Reservoir Sampling of 1000: approval rating was below the full 10,000 tweets, but only by average error rate of 1.2%</a:t>
+            </a:r>
           </a:p>
         </p:txBody>
       </p:sp>
     </p:spTree>
     <p:extLst>
       <p:ext uri="{BB962C8B-B14F-4D97-AF65-F5344CB8AC3E}">
-        <p14:creationId xmlns:p14="http://schemas.microsoft.com/office/powerpoint/2010/main" val="1100173245"/>
+        <p14:creationId xmlns:p14="http://schemas.microsoft.com/office/powerpoint/2010/main" val="3829973443"/>
       </p:ext>
     </p:extLst>
   </p:cSld>
@@ -5822,7 +6050,7 @@
           <a:p>
             <a:r>
               <a:rPr lang="en-US" dirty="0"/>
-              <a:t>Experiment Results—New</a:t>
+              <a:t>Experiment Results—New(After Presentation)</a:t>
             </a:r>
           </a:p>
         </p:txBody>
@@ -5848,7 +6076,19 @@
             </a:pPr>
             <a:r>
               <a:rPr lang="en-US" dirty="0"/>
-              <a:t>(In Progress)—Donald Trump Tweets from December 6th</a:t>
+              <a:t>(</a:t>
+            </a:r>
+            <a:r>
+              <a:rPr lang="en-US" b="1" u="sng" dirty="0"/>
+              <a:t>Update: Since laptop was stolen, I have re-mined tweets again this time focusing on Donald Trump (Tweets from Dec. 6</a:t>
+            </a:r>
+            <a:r>
+              <a:rPr lang="en-US" b="1" u="sng" baseline="30000" dirty="0"/>
+              <a:t>th</a:t>
+            </a:r>
+            <a:r>
+              <a:rPr lang="en-US" b="1" u="sng" dirty="0"/>
+              <a:t>) and his current support</a:t>
             </a:r>
           </a:p>
           <a:p>
@@ -5858,7 +6098,7 @@
             </a:pPr>
             <a:r>
               <a:rPr lang="en-US" dirty="0"/>
-              <a:t>Comparison of speed of classifiers</a:t>
+              <a:t>Labeled sample of 400 tweets (200 positive, 200 negative)</a:t>
             </a:r>
           </a:p>
           <a:p>
@@ -5868,7 +6108,7 @@
             </a:pPr>
             <a:r>
               <a:rPr lang="en-US" dirty="0"/>
-              <a:t>Comparison of accuracy of classifiers </a:t>
+              <a:t>Compare With smaller random sample of 200 tweets for training</a:t>
             </a:r>
           </a:p>
           <a:p>
@@ -5878,7 +6118,7 @@
             </a:pPr>
             <a:r>
               <a:rPr lang="en-US" dirty="0"/>
-              <a:t>Accuracy of Reservoir Sample versus all tweets and random sample</a:t>
+              <a:t>For reservoir sample testing: used 6000 tweets this time around of Donald Trump from Dec. 6, 2016</a:t>
             </a:r>
           </a:p>
           <a:p>
@@ -5888,15 +6128,22 @@
             </a:pPr>
             <a:r>
               <a:rPr lang="en-US" dirty="0"/>
-              <a:t>Figure of reservoir sample over time compared to all tweets stream </a:t>
-            </a:r>
+              <a:t>Tested accuracy comparison of averages for 400 tweet-classifier on total, reservoir, and random sampling</a:t>
+            </a:r>
+          </a:p>
+          <a:p>
+            <a:pPr>
+              <a:buFont typeface="Wingdings" panose="05000000000000000000" pitchFamily="2" charset="2"/>
+              <a:buChar char="§"/>
+            </a:pPr>
+            <a:endParaRPr lang="en-US" dirty="0"/>
           </a:p>
         </p:txBody>
       </p:sp>
     </p:spTree>
     <p:extLst>
       <p:ext uri="{BB962C8B-B14F-4D97-AF65-F5344CB8AC3E}">
-        <p14:creationId xmlns:p14="http://schemas.microsoft.com/office/powerpoint/2010/main" val="3539653021"/>
+        <p14:creationId xmlns:p14="http://schemas.microsoft.com/office/powerpoint/2010/main" val="1100173245"/>
       </p:ext>
     </p:extLst>
   </p:cSld>
@@ -5935,13 +6182,24 @@
         </p:nvSpPr>
         <p:spPr/>
         <p:txBody>
-          <a:bodyPr/>
+          <a:bodyPr>
+            <a:normAutofit/>
+          </a:bodyPr>
           <a:lstStyle/>
           <a:p>
             <a:r>
               <a:rPr lang="en-US" dirty="0"/>
-              <a:t>Conclusion &amp; Future Work</a:t>
-            </a:r>
+              <a:t>Experiment Results—400 Sample Size; </a:t>
+            </a:r>
+            <a:r>
+              <a:rPr lang="en-US" dirty="0">
+                <a:solidFill>
+                  <a:schemeClr val="tx1"/>
+                </a:solidFill>
+              </a:rPr>
+              <a:t>(f1 scores for each classifier)</a:t>
+            </a:r>
+            <a:endParaRPr lang="en-US" dirty="0"/>
           </a:p>
         </p:txBody>
       </p:sp>
@@ -5955,106 +6213,1024 @@
             <p:ph idx="1"/>
           </p:nvPr>
         </p:nvSpPr>
-        <p:spPr/>
-        <p:txBody>
-          <a:bodyPr/>
+        <p:spPr>
+          <a:xfrm>
+            <a:off x="1097279" y="1845734"/>
+            <a:ext cx="3315330" cy="4023360"/>
+          </a:xfrm>
+        </p:spPr>
+        <p:txBody>
+          <a:bodyPr>
+            <a:normAutofit fontScale="92500" lnSpcReduction="10000"/>
+          </a:bodyPr>
           <a:lstStyle/>
           <a:p>
-            <a:pPr>
-              <a:buFont typeface="Wingdings" panose="05000000000000000000" pitchFamily="2" charset="2"/>
-              <a:buChar char="§"/>
-            </a:pPr>
-            <a:r>
-              <a:rPr lang="en-US" dirty="0"/>
-              <a:t>Have tested two random sampling techniques to improve time of pipeline</a:t>
-            </a:r>
-          </a:p>
-          <a:p>
-            <a:pPr lvl="1">
-              <a:buFont typeface="Wingdings" panose="05000000000000000000" pitchFamily="2" charset="2"/>
-              <a:buChar char="§"/>
-            </a:pPr>
-            <a:r>
-              <a:rPr lang="en-US" dirty="0"/>
-              <a:t>Used random smaller sample to train classifier to decrease time taken while maintaining accuracy</a:t>
-            </a:r>
-          </a:p>
-          <a:p>
-            <a:pPr lvl="1">
-              <a:buFont typeface="Wingdings" panose="05000000000000000000" pitchFamily="2" charset="2"/>
-              <a:buChar char="§"/>
-            </a:pPr>
-            <a:r>
-              <a:rPr lang="en-US" dirty="0"/>
-              <a:t>Used reservoir sampling to decrease amount of tweets needed to be kept (save space) as well as save time compared to taking a random sample each time</a:t>
-            </a:r>
-          </a:p>
-          <a:p>
-            <a:pPr>
-              <a:buFont typeface="Wingdings" panose="05000000000000000000" pitchFamily="2" charset="2"/>
-              <a:buChar char="§"/>
-            </a:pPr>
-            <a:r>
-              <a:rPr lang="en-US" dirty="0"/>
-              <a:t>Can be applied to other social media; pull dataset from Yelp, Facebook, etc.</a:t>
-            </a:r>
-          </a:p>
-          <a:p>
-            <a:pPr>
-              <a:buFont typeface="Wingdings" panose="05000000000000000000" pitchFamily="2" charset="2"/>
-              <a:buChar char="§"/>
-            </a:pPr>
-            <a:r>
-              <a:rPr lang="en-US" dirty="0"/>
-              <a:t>Can be used in other political elections or even on approval ratings for bills/propositions</a:t>
-            </a:r>
-          </a:p>
-          <a:p>
-            <a:pPr>
-              <a:buFont typeface="Wingdings" panose="05000000000000000000" pitchFamily="2" charset="2"/>
-              <a:buChar char="§"/>
-            </a:pPr>
-            <a:r>
-              <a:rPr lang="en-US" dirty="0"/>
-              <a:t>Future work</a:t>
-            </a:r>
-          </a:p>
-          <a:p>
-            <a:pPr lvl="1">
-              <a:buFont typeface="Wingdings" panose="05000000000000000000" pitchFamily="2" charset="2"/>
-              <a:buChar char="§"/>
-            </a:pPr>
-            <a:r>
-              <a:rPr lang="en-US" dirty="0"/>
-              <a:t>Apply to Donald Trump Tweets over more time</a:t>
-            </a:r>
-          </a:p>
-          <a:p>
-            <a:pPr lvl="1">
-              <a:buFont typeface="Wingdings" panose="05000000000000000000" pitchFamily="2" charset="2"/>
-              <a:buChar char="§"/>
-            </a:pPr>
-            <a:r>
-              <a:rPr lang="en-US" dirty="0"/>
-              <a:t>Apply to another elected official/candidate</a:t>
-            </a:r>
-          </a:p>
-          <a:p>
-            <a:pPr lvl="1">
-              <a:buFont typeface="Wingdings" panose="05000000000000000000" pitchFamily="2" charset="2"/>
-              <a:buChar char="§"/>
-            </a:pPr>
-            <a:r>
-              <a:rPr lang="en-US" dirty="0"/>
-              <a:t>Change classifier into 3 classes: positive, neutral, negative and retest pipeline and randomization</a:t>
-            </a:r>
+            <a:pPr marL="0" indent="0">
+              <a:buNone/>
+            </a:pPr>
+            <a:r>
+              <a:rPr lang="en-US" u="sng" dirty="0"/>
+              <a:t>count(</a:t>
+            </a:r>
+            <a:r>
+              <a:rPr lang="en-US" u="sng" dirty="0" err="1"/>
+              <a:t>word+score</a:t>
+            </a:r>
+            <a:r>
+              <a:rPr lang="en-US" u="sng" dirty="0"/>
+              <a:t>)(2-3) </a:t>
+            </a:r>
+            <a:r>
+              <a:rPr lang="en-US" b="1" u="sng" dirty="0"/>
+              <a:t>93.146s</a:t>
+            </a:r>
+          </a:p>
+          <a:p>
+            <a:pPr marL="0" indent="0">
+              <a:buNone/>
+            </a:pPr>
+            <a:r>
+              <a:rPr lang="en-US" b="1" dirty="0">
+                <a:solidFill>
+                  <a:srgbClr val="FF0000"/>
+                </a:solidFill>
+              </a:rPr>
+              <a:t>svc: 0.649561568085</a:t>
+            </a:r>
+          </a:p>
+          <a:p>
+            <a:pPr marL="0" indent="0">
+              <a:buNone/>
+            </a:pPr>
+            <a:r>
+              <a:rPr lang="en-US" dirty="0" err="1"/>
+              <a:t>gnb</a:t>
+            </a:r>
+            <a:r>
+              <a:rPr lang="en-US" dirty="0"/>
+              <a:t>: 0.5208608176</a:t>
+            </a:r>
+          </a:p>
+          <a:p>
+            <a:pPr marL="0" indent="0">
+              <a:buNone/>
+            </a:pPr>
+            <a:r>
+              <a:rPr lang="en-US" dirty="0" err="1"/>
+              <a:t>lgr</a:t>
+            </a:r>
+            <a:r>
+              <a:rPr lang="en-US" dirty="0"/>
+              <a:t>: 0.641805527404</a:t>
+            </a:r>
+          </a:p>
+          <a:p>
+            <a:pPr marL="0" indent="0">
+              <a:buNone/>
+            </a:pPr>
+            <a:r>
+              <a:rPr lang="en-US" dirty="0" err="1"/>
+              <a:t>sgd</a:t>
+            </a:r>
+            <a:r>
+              <a:rPr lang="en-US" dirty="0"/>
+              <a:t>: 0.632294487482</a:t>
+            </a:r>
+          </a:p>
+          <a:p>
+            <a:pPr marL="0" indent="0">
+              <a:buNone/>
+            </a:pPr>
+            <a:r>
+              <a:rPr lang="en-US" dirty="0" err="1"/>
+              <a:t>knn</a:t>
+            </a:r>
+            <a:r>
+              <a:rPr lang="en-US" dirty="0"/>
+              <a:t>: 0.466596353505</a:t>
+            </a:r>
+          </a:p>
+          <a:p>
+            <a:pPr marL="0" indent="0">
+              <a:buNone/>
+            </a:pPr>
+            <a:r>
+              <a:rPr lang="en-US" dirty="0" err="1"/>
+              <a:t>dtc</a:t>
+            </a:r>
+            <a:r>
+              <a:rPr lang="en-US" dirty="0"/>
+              <a:t>: 0.571007872994</a:t>
+            </a:r>
+          </a:p>
+          <a:p>
+            <a:pPr marL="0" indent="0">
+              <a:buNone/>
+            </a:pPr>
+            <a:r>
+              <a:rPr lang="en-US" dirty="0" err="1"/>
+              <a:t>rfc</a:t>
+            </a:r>
+            <a:r>
+              <a:rPr lang="en-US" dirty="0"/>
+              <a:t>: 0.463463336887</a:t>
+            </a:r>
+          </a:p>
+          <a:p>
+            <a:pPr marL="0" indent="0">
+              <a:buNone/>
+            </a:pPr>
+            <a:r>
+              <a:rPr lang="en-US" dirty="0"/>
+              <a:t>soft </a:t>
+            </a:r>
+            <a:r>
+              <a:rPr lang="en-US" dirty="0" err="1"/>
+              <a:t>voc</a:t>
+            </a:r>
+            <a:r>
+              <a:rPr lang="en-US" dirty="0"/>
+              <a:t>: 0.594174633452</a:t>
+            </a:r>
+          </a:p>
+          <a:p>
+            <a:pPr marL="0" indent="0">
+              <a:buNone/>
+            </a:pPr>
+            <a:r>
+              <a:rPr lang="en-US" dirty="0"/>
+              <a:t>hard </a:t>
+            </a:r>
+            <a:r>
+              <a:rPr lang="en-US" dirty="0" err="1"/>
+              <a:t>voc</a:t>
+            </a:r>
+            <a:r>
+              <a:rPr lang="en-US" dirty="0"/>
+              <a:t>: 0.608975062333</a:t>
+            </a:r>
+          </a:p>
+        </p:txBody>
+      </p:sp>
+      <p:sp>
+        <p:nvSpPr>
+          <p:cNvPr id="4" name="Content Placeholder 2"/>
+          <p:cNvSpPr txBox="1">
+            <a:spLocks/>
+          </p:cNvSpPr>
+          <p:nvPr/>
+        </p:nvSpPr>
+        <p:spPr>
+          <a:xfrm>
+            <a:off x="4412609" y="1845734"/>
+            <a:ext cx="3315330" cy="4023360"/>
+          </a:xfrm>
+          <a:prstGeom prst="rect">
+            <a:avLst/>
+          </a:prstGeom>
+        </p:spPr>
+        <p:txBody>
+          <a:bodyPr vert="horz" lIns="0" tIns="45720" rIns="0" bIns="45720" rtlCol="0">
+            <a:normAutofit fontScale="92500" lnSpcReduction="10000"/>
+          </a:bodyPr>
+          <a:lstStyle>
+            <a:lvl1pPr marL="91440" indent="-91440" algn="l" defTabSz="914400" rtl="0" eaLnBrk="1" latinLnBrk="0" hangingPunct="1">
+              <a:lnSpc>
+                <a:spcPct val="90000"/>
+              </a:lnSpc>
+              <a:spcBef>
+                <a:spcPts val="1200"/>
+              </a:spcBef>
+              <a:spcAft>
+                <a:spcPts val="200"/>
+              </a:spcAft>
+              <a:buClr>
+                <a:schemeClr val="accent1"/>
+              </a:buClr>
+              <a:buSzPct val="100000"/>
+              <a:buFont typeface="Calibri" panose="020F0502020204030204" pitchFamily="34" charset="0"/>
+              <a:buChar char=" "/>
+              <a:defRPr sz="2000" kern="1200">
+                <a:solidFill>
+                  <a:schemeClr val="tx1">
+                    <a:lumMod val="75000"/>
+                    <a:lumOff val="25000"/>
+                  </a:schemeClr>
+                </a:solidFill>
+                <a:latin typeface="+mn-lt"/>
+                <a:ea typeface="+mn-ea"/>
+                <a:cs typeface="+mn-cs"/>
+              </a:defRPr>
+            </a:lvl1pPr>
+            <a:lvl2pPr marL="384048" indent="-182880" algn="l" defTabSz="914400" rtl="0" eaLnBrk="1" latinLnBrk="0" hangingPunct="1">
+              <a:lnSpc>
+                <a:spcPct val="90000"/>
+              </a:lnSpc>
+              <a:spcBef>
+                <a:spcPts val="200"/>
+              </a:spcBef>
+              <a:spcAft>
+                <a:spcPts val="400"/>
+              </a:spcAft>
+              <a:buClr>
+                <a:schemeClr val="accent1"/>
+              </a:buClr>
+              <a:buFont typeface="Calibri" pitchFamily="34" charset="0"/>
+              <a:buChar char="◦"/>
+              <a:defRPr sz="1800" kern="1200">
+                <a:solidFill>
+                  <a:schemeClr val="tx1">
+                    <a:lumMod val="75000"/>
+                    <a:lumOff val="25000"/>
+                  </a:schemeClr>
+                </a:solidFill>
+                <a:latin typeface="+mn-lt"/>
+                <a:ea typeface="+mn-ea"/>
+                <a:cs typeface="+mn-cs"/>
+              </a:defRPr>
+            </a:lvl2pPr>
+            <a:lvl3pPr marL="566928" indent="-182880" algn="l" defTabSz="914400" rtl="0" eaLnBrk="1" latinLnBrk="0" hangingPunct="1">
+              <a:lnSpc>
+                <a:spcPct val="90000"/>
+              </a:lnSpc>
+              <a:spcBef>
+                <a:spcPts val="200"/>
+              </a:spcBef>
+              <a:spcAft>
+                <a:spcPts val="400"/>
+              </a:spcAft>
+              <a:buClr>
+                <a:schemeClr val="accent1"/>
+              </a:buClr>
+              <a:buFont typeface="Calibri" pitchFamily="34" charset="0"/>
+              <a:buChar char="◦"/>
+              <a:defRPr sz="1400" kern="1200">
+                <a:solidFill>
+                  <a:schemeClr val="tx1">
+                    <a:lumMod val="75000"/>
+                    <a:lumOff val="25000"/>
+                  </a:schemeClr>
+                </a:solidFill>
+                <a:latin typeface="+mn-lt"/>
+                <a:ea typeface="+mn-ea"/>
+                <a:cs typeface="+mn-cs"/>
+              </a:defRPr>
+            </a:lvl3pPr>
+            <a:lvl4pPr marL="749808" indent="-182880" algn="l" defTabSz="914400" rtl="0" eaLnBrk="1" latinLnBrk="0" hangingPunct="1">
+              <a:lnSpc>
+                <a:spcPct val="90000"/>
+              </a:lnSpc>
+              <a:spcBef>
+                <a:spcPts val="200"/>
+              </a:spcBef>
+              <a:spcAft>
+                <a:spcPts val="400"/>
+              </a:spcAft>
+              <a:buClr>
+                <a:schemeClr val="accent1"/>
+              </a:buClr>
+              <a:buFont typeface="Calibri" pitchFamily="34" charset="0"/>
+              <a:buChar char="◦"/>
+              <a:defRPr sz="1400" kern="1200">
+                <a:solidFill>
+                  <a:schemeClr val="tx1">
+                    <a:lumMod val="75000"/>
+                    <a:lumOff val="25000"/>
+                  </a:schemeClr>
+                </a:solidFill>
+                <a:latin typeface="+mn-lt"/>
+                <a:ea typeface="+mn-ea"/>
+                <a:cs typeface="+mn-cs"/>
+              </a:defRPr>
+            </a:lvl4pPr>
+            <a:lvl5pPr marL="932688" indent="-182880" algn="l" defTabSz="914400" rtl="0" eaLnBrk="1" latinLnBrk="0" hangingPunct="1">
+              <a:lnSpc>
+                <a:spcPct val="90000"/>
+              </a:lnSpc>
+              <a:spcBef>
+                <a:spcPts val="200"/>
+              </a:spcBef>
+              <a:spcAft>
+                <a:spcPts val="400"/>
+              </a:spcAft>
+              <a:buClr>
+                <a:schemeClr val="accent1"/>
+              </a:buClr>
+              <a:buFont typeface="Calibri" pitchFamily="34" charset="0"/>
+              <a:buChar char="◦"/>
+              <a:defRPr sz="1400" kern="1200">
+                <a:solidFill>
+                  <a:schemeClr val="tx1">
+                    <a:lumMod val="75000"/>
+                    <a:lumOff val="25000"/>
+                  </a:schemeClr>
+                </a:solidFill>
+                <a:latin typeface="+mn-lt"/>
+                <a:ea typeface="+mn-ea"/>
+                <a:cs typeface="+mn-cs"/>
+              </a:defRPr>
+            </a:lvl5pPr>
+            <a:lvl6pPr marL="1100000" indent="-228600" algn="l" defTabSz="914400" rtl="0" eaLnBrk="1" latinLnBrk="0" hangingPunct="1">
+              <a:lnSpc>
+                <a:spcPct val="90000"/>
+              </a:lnSpc>
+              <a:spcBef>
+                <a:spcPts val="200"/>
+              </a:spcBef>
+              <a:spcAft>
+                <a:spcPts val="400"/>
+              </a:spcAft>
+              <a:buClr>
+                <a:schemeClr val="accent1"/>
+              </a:buClr>
+              <a:buFont typeface="Calibri" pitchFamily="34" charset="0"/>
+              <a:buChar char="◦"/>
+              <a:defRPr sz="1400" kern="1200">
+                <a:solidFill>
+                  <a:schemeClr val="tx1">
+                    <a:lumMod val="75000"/>
+                    <a:lumOff val="25000"/>
+                  </a:schemeClr>
+                </a:solidFill>
+                <a:latin typeface="+mn-lt"/>
+                <a:ea typeface="+mn-ea"/>
+                <a:cs typeface="+mn-cs"/>
+              </a:defRPr>
+            </a:lvl6pPr>
+            <a:lvl7pPr marL="1300000" indent="-228600" algn="l" defTabSz="914400" rtl="0" eaLnBrk="1" latinLnBrk="0" hangingPunct="1">
+              <a:lnSpc>
+                <a:spcPct val="90000"/>
+              </a:lnSpc>
+              <a:spcBef>
+                <a:spcPts val="200"/>
+              </a:spcBef>
+              <a:spcAft>
+                <a:spcPts val="400"/>
+              </a:spcAft>
+              <a:buClr>
+                <a:schemeClr val="accent1"/>
+              </a:buClr>
+              <a:buFont typeface="Calibri" pitchFamily="34" charset="0"/>
+              <a:buChar char="◦"/>
+              <a:defRPr sz="1400" kern="1200">
+                <a:solidFill>
+                  <a:schemeClr val="tx1">
+                    <a:lumMod val="75000"/>
+                    <a:lumOff val="25000"/>
+                  </a:schemeClr>
+                </a:solidFill>
+                <a:latin typeface="+mn-lt"/>
+                <a:ea typeface="+mn-ea"/>
+                <a:cs typeface="+mn-cs"/>
+              </a:defRPr>
+            </a:lvl7pPr>
+            <a:lvl8pPr marL="1500000" indent="-228600" algn="l" defTabSz="914400" rtl="0" eaLnBrk="1" latinLnBrk="0" hangingPunct="1">
+              <a:lnSpc>
+                <a:spcPct val="90000"/>
+              </a:lnSpc>
+              <a:spcBef>
+                <a:spcPts val="200"/>
+              </a:spcBef>
+              <a:spcAft>
+                <a:spcPts val="400"/>
+              </a:spcAft>
+              <a:buClr>
+                <a:schemeClr val="accent1"/>
+              </a:buClr>
+              <a:buFont typeface="Calibri" pitchFamily="34" charset="0"/>
+              <a:buChar char="◦"/>
+              <a:defRPr sz="1400" kern="1200">
+                <a:solidFill>
+                  <a:schemeClr val="tx1">
+                    <a:lumMod val="75000"/>
+                    <a:lumOff val="25000"/>
+                  </a:schemeClr>
+                </a:solidFill>
+                <a:latin typeface="+mn-lt"/>
+                <a:ea typeface="+mn-ea"/>
+                <a:cs typeface="+mn-cs"/>
+              </a:defRPr>
+            </a:lvl8pPr>
+            <a:lvl9pPr marL="1700000" indent="-228600" algn="l" defTabSz="914400" rtl="0" eaLnBrk="1" latinLnBrk="0" hangingPunct="1">
+              <a:lnSpc>
+                <a:spcPct val="90000"/>
+              </a:lnSpc>
+              <a:spcBef>
+                <a:spcPts val="200"/>
+              </a:spcBef>
+              <a:spcAft>
+                <a:spcPts val="400"/>
+              </a:spcAft>
+              <a:buClr>
+                <a:schemeClr val="accent1"/>
+              </a:buClr>
+              <a:buFont typeface="Calibri" pitchFamily="34" charset="0"/>
+              <a:buChar char="◦"/>
+              <a:defRPr sz="1400" kern="1200">
+                <a:solidFill>
+                  <a:schemeClr val="tx1">
+                    <a:lumMod val="75000"/>
+                    <a:lumOff val="25000"/>
+                  </a:schemeClr>
+                </a:solidFill>
+                <a:latin typeface="+mn-lt"/>
+                <a:ea typeface="+mn-ea"/>
+                <a:cs typeface="+mn-cs"/>
+              </a:defRPr>
+            </a:lvl9pPr>
+          </a:lstStyle>
+          <a:p>
+            <a:pPr marL="0" indent="0">
+              <a:buNone/>
+            </a:pPr>
+            <a:r>
+              <a:rPr lang="en-US" u="sng" dirty="0" err="1"/>
+              <a:t>tfidf</a:t>
+            </a:r>
+            <a:r>
+              <a:rPr lang="en-US" u="sng" dirty="0"/>
+              <a:t>(</a:t>
+            </a:r>
+            <a:r>
+              <a:rPr lang="en-US" u="sng" dirty="0" err="1"/>
+              <a:t>char+score</a:t>
+            </a:r>
+            <a:r>
+              <a:rPr lang="en-US" u="sng" dirty="0"/>
+              <a:t>)(1-4) </a:t>
+            </a:r>
+            <a:r>
+              <a:rPr lang="en-US" b="1" u="sng" dirty="0"/>
+              <a:t>102.172s</a:t>
+            </a:r>
+            <a:r>
+              <a:rPr lang="en-US" u="sng" dirty="0"/>
+              <a:t> </a:t>
+            </a:r>
+          </a:p>
+          <a:p>
+            <a:pPr marL="0" indent="0">
+              <a:buNone/>
+            </a:pPr>
+            <a:r>
+              <a:rPr lang="en-US" dirty="0"/>
+              <a:t>svc: 0.689612222526</a:t>
+            </a:r>
+          </a:p>
+          <a:p>
+            <a:pPr marL="0" indent="0">
+              <a:buNone/>
+            </a:pPr>
+            <a:r>
+              <a:rPr lang="en-US" dirty="0" err="1"/>
+              <a:t>gnb</a:t>
+            </a:r>
+            <a:r>
+              <a:rPr lang="en-US" dirty="0"/>
+              <a:t>: 0.601457339317</a:t>
+            </a:r>
+          </a:p>
+          <a:p>
+            <a:pPr marL="0" indent="0">
+              <a:buNone/>
+            </a:pPr>
+            <a:r>
+              <a:rPr lang="en-US" dirty="0" err="1"/>
+              <a:t>lgr</a:t>
+            </a:r>
+            <a:r>
+              <a:rPr lang="en-US" dirty="0"/>
+              <a:t>: 0.694846586696</a:t>
+            </a:r>
+          </a:p>
+          <a:p>
+            <a:pPr marL="0" indent="0">
+              <a:buNone/>
+            </a:pPr>
+            <a:r>
+              <a:rPr lang="en-US" dirty="0" err="1"/>
+              <a:t>sgd</a:t>
+            </a:r>
+            <a:r>
+              <a:rPr lang="en-US" dirty="0"/>
+              <a:t>: 0.579201178901</a:t>
+            </a:r>
+          </a:p>
+          <a:p>
+            <a:pPr marL="0" indent="0">
+              <a:buNone/>
+            </a:pPr>
+            <a:r>
+              <a:rPr lang="en-US" dirty="0" err="1"/>
+              <a:t>knn</a:t>
+            </a:r>
+            <a:r>
+              <a:rPr lang="en-US" dirty="0"/>
+              <a:t>: 0.596530272476</a:t>
+            </a:r>
+          </a:p>
+          <a:p>
+            <a:pPr marL="0" indent="0">
+              <a:buNone/>
+            </a:pPr>
+            <a:r>
+              <a:rPr lang="en-US" dirty="0" err="1"/>
+              <a:t>dtc</a:t>
+            </a:r>
+            <a:r>
+              <a:rPr lang="en-US" dirty="0"/>
+              <a:t>: 0.583951333026</a:t>
+            </a:r>
+          </a:p>
+          <a:p>
+            <a:pPr marL="0" indent="0">
+              <a:buNone/>
+            </a:pPr>
+            <a:r>
+              <a:rPr lang="en-US" dirty="0" err="1"/>
+              <a:t>rfc</a:t>
+            </a:r>
+            <a:r>
+              <a:rPr lang="en-US" dirty="0"/>
+              <a:t>: 0.575218866183</a:t>
+            </a:r>
+          </a:p>
+          <a:p>
+            <a:pPr marL="0" indent="0">
+              <a:buNone/>
+            </a:pPr>
+            <a:r>
+              <a:rPr lang="en-US" dirty="0"/>
+              <a:t>soft </a:t>
+            </a:r>
+            <a:r>
+              <a:rPr lang="en-US" dirty="0" err="1"/>
+              <a:t>voc</a:t>
+            </a:r>
+            <a:r>
+              <a:rPr lang="en-US" dirty="0"/>
+              <a:t>: 0.674683097813</a:t>
+            </a:r>
+          </a:p>
+          <a:p>
+            <a:pPr marL="0" indent="0">
+              <a:buNone/>
+            </a:pPr>
+            <a:r>
+              <a:rPr lang="en-US" b="1" dirty="0">
+                <a:solidFill>
+                  <a:srgbClr val="FF0000"/>
+                </a:solidFill>
+              </a:rPr>
+              <a:t>hard </a:t>
+            </a:r>
+            <a:r>
+              <a:rPr lang="en-US" b="1" dirty="0" err="1">
+                <a:solidFill>
+                  <a:srgbClr val="FF0000"/>
+                </a:solidFill>
+              </a:rPr>
+              <a:t>voc</a:t>
+            </a:r>
+            <a:r>
+              <a:rPr lang="en-US" b="1" dirty="0">
+                <a:solidFill>
+                  <a:srgbClr val="FF0000"/>
+                </a:solidFill>
+              </a:rPr>
+              <a:t>: 0.696358144974</a:t>
+            </a:r>
+          </a:p>
+        </p:txBody>
+      </p:sp>
+      <p:sp>
+        <p:nvSpPr>
+          <p:cNvPr id="6" name="Content Placeholder 2"/>
+          <p:cNvSpPr txBox="1">
+            <a:spLocks/>
+          </p:cNvSpPr>
+          <p:nvPr/>
+        </p:nvSpPr>
+        <p:spPr>
+          <a:xfrm>
+            <a:off x="7727939" y="1845734"/>
+            <a:ext cx="3315330" cy="4023360"/>
+          </a:xfrm>
+          <a:prstGeom prst="rect">
+            <a:avLst/>
+          </a:prstGeom>
+        </p:spPr>
+        <p:txBody>
+          <a:bodyPr vert="horz" lIns="0" tIns="45720" rIns="0" bIns="45720" rtlCol="0">
+            <a:normAutofit fontScale="92500" lnSpcReduction="10000"/>
+          </a:bodyPr>
+          <a:lstStyle>
+            <a:lvl1pPr marL="91440" indent="-91440" algn="l" defTabSz="914400" rtl="0" eaLnBrk="1" latinLnBrk="0" hangingPunct="1">
+              <a:lnSpc>
+                <a:spcPct val="90000"/>
+              </a:lnSpc>
+              <a:spcBef>
+                <a:spcPts val="1200"/>
+              </a:spcBef>
+              <a:spcAft>
+                <a:spcPts val="200"/>
+              </a:spcAft>
+              <a:buClr>
+                <a:schemeClr val="accent1"/>
+              </a:buClr>
+              <a:buSzPct val="100000"/>
+              <a:buFont typeface="Calibri" panose="020F0502020204030204" pitchFamily="34" charset="0"/>
+              <a:buChar char=" "/>
+              <a:defRPr sz="2000" kern="1200">
+                <a:solidFill>
+                  <a:schemeClr val="tx1">
+                    <a:lumMod val="75000"/>
+                    <a:lumOff val="25000"/>
+                  </a:schemeClr>
+                </a:solidFill>
+                <a:latin typeface="+mn-lt"/>
+                <a:ea typeface="+mn-ea"/>
+                <a:cs typeface="+mn-cs"/>
+              </a:defRPr>
+            </a:lvl1pPr>
+            <a:lvl2pPr marL="384048" indent="-182880" algn="l" defTabSz="914400" rtl="0" eaLnBrk="1" latinLnBrk="0" hangingPunct="1">
+              <a:lnSpc>
+                <a:spcPct val="90000"/>
+              </a:lnSpc>
+              <a:spcBef>
+                <a:spcPts val="200"/>
+              </a:spcBef>
+              <a:spcAft>
+                <a:spcPts val="400"/>
+              </a:spcAft>
+              <a:buClr>
+                <a:schemeClr val="accent1"/>
+              </a:buClr>
+              <a:buFont typeface="Calibri" pitchFamily="34" charset="0"/>
+              <a:buChar char="◦"/>
+              <a:defRPr sz="1800" kern="1200">
+                <a:solidFill>
+                  <a:schemeClr val="tx1">
+                    <a:lumMod val="75000"/>
+                    <a:lumOff val="25000"/>
+                  </a:schemeClr>
+                </a:solidFill>
+                <a:latin typeface="+mn-lt"/>
+                <a:ea typeface="+mn-ea"/>
+                <a:cs typeface="+mn-cs"/>
+              </a:defRPr>
+            </a:lvl2pPr>
+            <a:lvl3pPr marL="566928" indent="-182880" algn="l" defTabSz="914400" rtl="0" eaLnBrk="1" latinLnBrk="0" hangingPunct="1">
+              <a:lnSpc>
+                <a:spcPct val="90000"/>
+              </a:lnSpc>
+              <a:spcBef>
+                <a:spcPts val="200"/>
+              </a:spcBef>
+              <a:spcAft>
+                <a:spcPts val="400"/>
+              </a:spcAft>
+              <a:buClr>
+                <a:schemeClr val="accent1"/>
+              </a:buClr>
+              <a:buFont typeface="Calibri" pitchFamily="34" charset="0"/>
+              <a:buChar char="◦"/>
+              <a:defRPr sz="1400" kern="1200">
+                <a:solidFill>
+                  <a:schemeClr val="tx1">
+                    <a:lumMod val="75000"/>
+                    <a:lumOff val="25000"/>
+                  </a:schemeClr>
+                </a:solidFill>
+                <a:latin typeface="+mn-lt"/>
+                <a:ea typeface="+mn-ea"/>
+                <a:cs typeface="+mn-cs"/>
+              </a:defRPr>
+            </a:lvl3pPr>
+            <a:lvl4pPr marL="749808" indent="-182880" algn="l" defTabSz="914400" rtl="0" eaLnBrk="1" latinLnBrk="0" hangingPunct="1">
+              <a:lnSpc>
+                <a:spcPct val="90000"/>
+              </a:lnSpc>
+              <a:spcBef>
+                <a:spcPts val="200"/>
+              </a:spcBef>
+              <a:spcAft>
+                <a:spcPts val="400"/>
+              </a:spcAft>
+              <a:buClr>
+                <a:schemeClr val="accent1"/>
+              </a:buClr>
+              <a:buFont typeface="Calibri" pitchFamily="34" charset="0"/>
+              <a:buChar char="◦"/>
+              <a:defRPr sz="1400" kern="1200">
+                <a:solidFill>
+                  <a:schemeClr val="tx1">
+                    <a:lumMod val="75000"/>
+                    <a:lumOff val="25000"/>
+                  </a:schemeClr>
+                </a:solidFill>
+                <a:latin typeface="+mn-lt"/>
+                <a:ea typeface="+mn-ea"/>
+                <a:cs typeface="+mn-cs"/>
+              </a:defRPr>
+            </a:lvl4pPr>
+            <a:lvl5pPr marL="932688" indent="-182880" algn="l" defTabSz="914400" rtl="0" eaLnBrk="1" latinLnBrk="0" hangingPunct="1">
+              <a:lnSpc>
+                <a:spcPct val="90000"/>
+              </a:lnSpc>
+              <a:spcBef>
+                <a:spcPts val="200"/>
+              </a:spcBef>
+              <a:spcAft>
+                <a:spcPts val="400"/>
+              </a:spcAft>
+              <a:buClr>
+                <a:schemeClr val="accent1"/>
+              </a:buClr>
+              <a:buFont typeface="Calibri" pitchFamily="34" charset="0"/>
+              <a:buChar char="◦"/>
+              <a:defRPr sz="1400" kern="1200">
+                <a:solidFill>
+                  <a:schemeClr val="tx1">
+                    <a:lumMod val="75000"/>
+                    <a:lumOff val="25000"/>
+                  </a:schemeClr>
+                </a:solidFill>
+                <a:latin typeface="+mn-lt"/>
+                <a:ea typeface="+mn-ea"/>
+                <a:cs typeface="+mn-cs"/>
+              </a:defRPr>
+            </a:lvl5pPr>
+            <a:lvl6pPr marL="1100000" indent="-228600" algn="l" defTabSz="914400" rtl="0" eaLnBrk="1" latinLnBrk="0" hangingPunct="1">
+              <a:lnSpc>
+                <a:spcPct val="90000"/>
+              </a:lnSpc>
+              <a:spcBef>
+                <a:spcPts val="200"/>
+              </a:spcBef>
+              <a:spcAft>
+                <a:spcPts val="400"/>
+              </a:spcAft>
+              <a:buClr>
+                <a:schemeClr val="accent1"/>
+              </a:buClr>
+              <a:buFont typeface="Calibri" pitchFamily="34" charset="0"/>
+              <a:buChar char="◦"/>
+              <a:defRPr sz="1400" kern="1200">
+                <a:solidFill>
+                  <a:schemeClr val="tx1">
+                    <a:lumMod val="75000"/>
+                    <a:lumOff val="25000"/>
+                  </a:schemeClr>
+                </a:solidFill>
+                <a:latin typeface="+mn-lt"/>
+                <a:ea typeface="+mn-ea"/>
+                <a:cs typeface="+mn-cs"/>
+              </a:defRPr>
+            </a:lvl6pPr>
+            <a:lvl7pPr marL="1300000" indent="-228600" algn="l" defTabSz="914400" rtl="0" eaLnBrk="1" latinLnBrk="0" hangingPunct="1">
+              <a:lnSpc>
+                <a:spcPct val="90000"/>
+              </a:lnSpc>
+              <a:spcBef>
+                <a:spcPts val="200"/>
+              </a:spcBef>
+              <a:spcAft>
+                <a:spcPts val="400"/>
+              </a:spcAft>
+              <a:buClr>
+                <a:schemeClr val="accent1"/>
+              </a:buClr>
+              <a:buFont typeface="Calibri" pitchFamily="34" charset="0"/>
+              <a:buChar char="◦"/>
+              <a:defRPr sz="1400" kern="1200">
+                <a:solidFill>
+                  <a:schemeClr val="tx1">
+                    <a:lumMod val="75000"/>
+                    <a:lumOff val="25000"/>
+                  </a:schemeClr>
+                </a:solidFill>
+                <a:latin typeface="+mn-lt"/>
+                <a:ea typeface="+mn-ea"/>
+                <a:cs typeface="+mn-cs"/>
+              </a:defRPr>
+            </a:lvl7pPr>
+            <a:lvl8pPr marL="1500000" indent="-228600" algn="l" defTabSz="914400" rtl="0" eaLnBrk="1" latinLnBrk="0" hangingPunct="1">
+              <a:lnSpc>
+                <a:spcPct val="90000"/>
+              </a:lnSpc>
+              <a:spcBef>
+                <a:spcPts val="200"/>
+              </a:spcBef>
+              <a:spcAft>
+                <a:spcPts val="400"/>
+              </a:spcAft>
+              <a:buClr>
+                <a:schemeClr val="accent1"/>
+              </a:buClr>
+              <a:buFont typeface="Calibri" pitchFamily="34" charset="0"/>
+              <a:buChar char="◦"/>
+              <a:defRPr sz="1400" kern="1200">
+                <a:solidFill>
+                  <a:schemeClr val="tx1">
+                    <a:lumMod val="75000"/>
+                    <a:lumOff val="25000"/>
+                  </a:schemeClr>
+                </a:solidFill>
+                <a:latin typeface="+mn-lt"/>
+                <a:ea typeface="+mn-ea"/>
+                <a:cs typeface="+mn-cs"/>
+              </a:defRPr>
+            </a:lvl8pPr>
+            <a:lvl9pPr marL="1700000" indent="-228600" algn="l" defTabSz="914400" rtl="0" eaLnBrk="1" latinLnBrk="0" hangingPunct="1">
+              <a:lnSpc>
+                <a:spcPct val="90000"/>
+              </a:lnSpc>
+              <a:spcBef>
+                <a:spcPts val="200"/>
+              </a:spcBef>
+              <a:spcAft>
+                <a:spcPts val="400"/>
+              </a:spcAft>
+              <a:buClr>
+                <a:schemeClr val="accent1"/>
+              </a:buClr>
+              <a:buFont typeface="Calibri" pitchFamily="34" charset="0"/>
+              <a:buChar char="◦"/>
+              <a:defRPr sz="1400" kern="1200">
+                <a:solidFill>
+                  <a:schemeClr val="tx1">
+                    <a:lumMod val="75000"/>
+                    <a:lumOff val="25000"/>
+                  </a:schemeClr>
+                </a:solidFill>
+                <a:latin typeface="+mn-lt"/>
+                <a:ea typeface="+mn-ea"/>
+                <a:cs typeface="+mn-cs"/>
+              </a:defRPr>
+            </a:lvl9pPr>
+          </a:lstStyle>
+          <a:p>
+            <a:pPr marL="0" indent="0">
+              <a:buNone/>
+            </a:pPr>
+            <a:r>
+              <a:rPr lang="en-US" u="sng" dirty="0" err="1"/>
+              <a:t>tfidf</a:t>
+            </a:r>
+            <a:r>
+              <a:rPr lang="en-US" u="sng" dirty="0"/>
+              <a:t>(</a:t>
+            </a:r>
+            <a:r>
+              <a:rPr lang="en-US" u="sng" dirty="0" err="1"/>
+              <a:t>word+score</a:t>
+            </a:r>
+            <a:r>
+              <a:rPr lang="en-US" u="sng" dirty="0"/>
+              <a:t>)(1-3) </a:t>
+            </a:r>
+            <a:r>
+              <a:rPr lang="en-US" b="1" u="sng" dirty="0"/>
+              <a:t>107.248s</a:t>
+            </a:r>
+          </a:p>
+          <a:p>
+            <a:pPr marL="0" indent="0">
+              <a:buNone/>
+            </a:pPr>
+            <a:r>
+              <a:rPr lang="en-US" b="1" dirty="0">
+                <a:solidFill>
+                  <a:srgbClr val="FF0000"/>
+                </a:solidFill>
+              </a:rPr>
+              <a:t>svc: 0.684670519728</a:t>
+            </a:r>
+          </a:p>
+          <a:p>
+            <a:pPr marL="0" indent="0">
+              <a:buNone/>
+            </a:pPr>
+            <a:r>
+              <a:rPr lang="en-US" dirty="0" err="1"/>
+              <a:t>gnb</a:t>
+            </a:r>
+            <a:r>
+              <a:rPr lang="en-US" dirty="0"/>
+              <a:t>: 0.559498762542</a:t>
+            </a:r>
+          </a:p>
+          <a:p>
+            <a:pPr marL="0" indent="0">
+              <a:buNone/>
+            </a:pPr>
+            <a:r>
+              <a:rPr lang="en-US" dirty="0" err="1"/>
+              <a:t>lgr</a:t>
+            </a:r>
+            <a:r>
+              <a:rPr lang="en-US" dirty="0"/>
+              <a:t>: 0.679301918208</a:t>
+            </a:r>
+          </a:p>
+          <a:p>
+            <a:pPr marL="0" indent="0">
+              <a:buNone/>
+            </a:pPr>
+            <a:r>
+              <a:rPr lang="en-US" dirty="0" err="1"/>
+              <a:t>sgd</a:t>
+            </a:r>
+            <a:r>
+              <a:rPr lang="en-US" dirty="0"/>
+              <a:t>: 0.584666727607</a:t>
+            </a:r>
+          </a:p>
+          <a:p>
+            <a:pPr marL="0" indent="0">
+              <a:buNone/>
+            </a:pPr>
+            <a:r>
+              <a:rPr lang="en-US" dirty="0" err="1"/>
+              <a:t>knn</a:t>
+            </a:r>
+            <a:r>
+              <a:rPr lang="en-US" dirty="0"/>
+              <a:t>: 0.600343549055</a:t>
+            </a:r>
+          </a:p>
+          <a:p>
+            <a:pPr marL="0" indent="0">
+              <a:buNone/>
+            </a:pPr>
+            <a:r>
+              <a:rPr lang="en-US" dirty="0" err="1"/>
+              <a:t>dtc</a:t>
+            </a:r>
+            <a:r>
+              <a:rPr lang="en-US" dirty="0"/>
+              <a:t>: 0.528953643075</a:t>
+            </a:r>
+          </a:p>
+          <a:p>
+            <a:pPr marL="0" indent="0">
+              <a:buNone/>
+            </a:pPr>
+            <a:r>
+              <a:rPr lang="en-US" dirty="0" err="1"/>
+              <a:t>rfc</a:t>
+            </a:r>
+            <a:r>
+              <a:rPr lang="en-US" dirty="0"/>
+              <a:t>: 0.533389033991</a:t>
+            </a:r>
+          </a:p>
+          <a:p>
+            <a:pPr marL="0" indent="0">
+              <a:buNone/>
+            </a:pPr>
+            <a:r>
+              <a:rPr lang="en-US" dirty="0"/>
+              <a:t>soft </a:t>
+            </a:r>
+            <a:r>
+              <a:rPr lang="en-US" dirty="0" err="1"/>
+              <a:t>voc</a:t>
+            </a:r>
+            <a:r>
+              <a:rPr lang="en-US" dirty="0"/>
+              <a:t>: 0.60144131876</a:t>
+            </a:r>
+          </a:p>
+          <a:p>
+            <a:pPr marL="0" indent="0">
+              <a:buNone/>
+            </a:pPr>
+            <a:r>
+              <a:rPr lang="en-US" dirty="0"/>
+              <a:t>hard </a:t>
+            </a:r>
+            <a:r>
+              <a:rPr lang="en-US" dirty="0" err="1"/>
+              <a:t>voc</a:t>
+            </a:r>
+            <a:r>
+              <a:rPr lang="en-US" dirty="0"/>
+              <a:t>: 0.679381774203</a:t>
+            </a:r>
+            <a:endParaRPr lang="en-US" b="1" dirty="0">
+              <a:solidFill>
+                <a:srgbClr val="FF0000"/>
+              </a:solidFill>
+            </a:endParaRPr>
           </a:p>
         </p:txBody>
       </p:sp>
     </p:spTree>
     <p:extLst>
       <p:ext uri="{BB962C8B-B14F-4D97-AF65-F5344CB8AC3E}">
-        <p14:creationId xmlns:p14="http://schemas.microsoft.com/office/powerpoint/2010/main" val="4095451030"/>
+        <p14:creationId xmlns:p14="http://schemas.microsoft.com/office/powerpoint/2010/main" val="3539653021"/>
       </p:ext>
     </p:extLst>
   </p:cSld>
@@ -6098,6 +7274,1731 @@
           <a:p>
             <a:r>
               <a:rPr lang="en-US" dirty="0"/>
+              <a:t>Experiment Results—200 sample size</a:t>
+            </a:r>
+          </a:p>
+        </p:txBody>
+      </p:sp>
+      <p:sp>
+        <p:nvSpPr>
+          <p:cNvPr id="4" name="Content Placeholder 2"/>
+          <p:cNvSpPr txBox="1">
+            <a:spLocks/>
+          </p:cNvSpPr>
+          <p:nvPr/>
+        </p:nvSpPr>
+        <p:spPr>
+          <a:xfrm>
+            <a:off x="1097279" y="1845734"/>
+            <a:ext cx="3315330" cy="4023360"/>
+          </a:xfrm>
+          <a:prstGeom prst="rect">
+            <a:avLst/>
+          </a:prstGeom>
+        </p:spPr>
+        <p:txBody>
+          <a:bodyPr vert="horz" lIns="0" tIns="45720" rIns="0" bIns="45720" rtlCol="0">
+            <a:normAutofit fontScale="92500" lnSpcReduction="10000"/>
+          </a:bodyPr>
+          <a:lstStyle>
+            <a:lvl1pPr marL="91440" indent="-91440" algn="l" defTabSz="914400" rtl="0" eaLnBrk="1" latinLnBrk="0" hangingPunct="1">
+              <a:lnSpc>
+                <a:spcPct val="90000"/>
+              </a:lnSpc>
+              <a:spcBef>
+                <a:spcPts val="1200"/>
+              </a:spcBef>
+              <a:spcAft>
+                <a:spcPts val="200"/>
+              </a:spcAft>
+              <a:buClr>
+                <a:schemeClr val="accent1"/>
+              </a:buClr>
+              <a:buSzPct val="100000"/>
+              <a:buFont typeface="Calibri" panose="020F0502020204030204" pitchFamily="34" charset="0"/>
+              <a:buChar char=" "/>
+              <a:defRPr sz="2000" kern="1200">
+                <a:solidFill>
+                  <a:schemeClr val="tx1">
+                    <a:lumMod val="75000"/>
+                    <a:lumOff val="25000"/>
+                  </a:schemeClr>
+                </a:solidFill>
+                <a:latin typeface="+mn-lt"/>
+                <a:ea typeface="+mn-ea"/>
+                <a:cs typeface="+mn-cs"/>
+              </a:defRPr>
+            </a:lvl1pPr>
+            <a:lvl2pPr marL="384048" indent="-182880" algn="l" defTabSz="914400" rtl="0" eaLnBrk="1" latinLnBrk="0" hangingPunct="1">
+              <a:lnSpc>
+                <a:spcPct val="90000"/>
+              </a:lnSpc>
+              <a:spcBef>
+                <a:spcPts val="200"/>
+              </a:spcBef>
+              <a:spcAft>
+                <a:spcPts val="400"/>
+              </a:spcAft>
+              <a:buClr>
+                <a:schemeClr val="accent1"/>
+              </a:buClr>
+              <a:buFont typeface="Calibri" pitchFamily="34" charset="0"/>
+              <a:buChar char="◦"/>
+              <a:defRPr sz="1800" kern="1200">
+                <a:solidFill>
+                  <a:schemeClr val="tx1">
+                    <a:lumMod val="75000"/>
+                    <a:lumOff val="25000"/>
+                  </a:schemeClr>
+                </a:solidFill>
+                <a:latin typeface="+mn-lt"/>
+                <a:ea typeface="+mn-ea"/>
+                <a:cs typeface="+mn-cs"/>
+              </a:defRPr>
+            </a:lvl2pPr>
+            <a:lvl3pPr marL="566928" indent="-182880" algn="l" defTabSz="914400" rtl="0" eaLnBrk="1" latinLnBrk="0" hangingPunct="1">
+              <a:lnSpc>
+                <a:spcPct val="90000"/>
+              </a:lnSpc>
+              <a:spcBef>
+                <a:spcPts val="200"/>
+              </a:spcBef>
+              <a:spcAft>
+                <a:spcPts val="400"/>
+              </a:spcAft>
+              <a:buClr>
+                <a:schemeClr val="accent1"/>
+              </a:buClr>
+              <a:buFont typeface="Calibri" pitchFamily="34" charset="0"/>
+              <a:buChar char="◦"/>
+              <a:defRPr sz="1400" kern="1200">
+                <a:solidFill>
+                  <a:schemeClr val="tx1">
+                    <a:lumMod val="75000"/>
+                    <a:lumOff val="25000"/>
+                  </a:schemeClr>
+                </a:solidFill>
+                <a:latin typeface="+mn-lt"/>
+                <a:ea typeface="+mn-ea"/>
+                <a:cs typeface="+mn-cs"/>
+              </a:defRPr>
+            </a:lvl3pPr>
+            <a:lvl4pPr marL="749808" indent="-182880" algn="l" defTabSz="914400" rtl="0" eaLnBrk="1" latinLnBrk="0" hangingPunct="1">
+              <a:lnSpc>
+                <a:spcPct val="90000"/>
+              </a:lnSpc>
+              <a:spcBef>
+                <a:spcPts val="200"/>
+              </a:spcBef>
+              <a:spcAft>
+                <a:spcPts val="400"/>
+              </a:spcAft>
+              <a:buClr>
+                <a:schemeClr val="accent1"/>
+              </a:buClr>
+              <a:buFont typeface="Calibri" pitchFamily="34" charset="0"/>
+              <a:buChar char="◦"/>
+              <a:defRPr sz="1400" kern="1200">
+                <a:solidFill>
+                  <a:schemeClr val="tx1">
+                    <a:lumMod val="75000"/>
+                    <a:lumOff val="25000"/>
+                  </a:schemeClr>
+                </a:solidFill>
+                <a:latin typeface="+mn-lt"/>
+                <a:ea typeface="+mn-ea"/>
+                <a:cs typeface="+mn-cs"/>
+              </a:defRPr>
+            </a:lvl4pPr>
+            <a:lvl5pPr marL="932688" indent="-182880" algn="l" defTabSz="914400" rtl="0" eaLnBrk="1" latinLnBrk="0" hangingPunct="1">
+              <a:lnSpc>
+                <a:spcPct val="90000"/>
+              </a:lnSpc>
+              <a:spcBef>
+                <a:spcPts val="200"/>
+              </a:spcBef>
+              <a:spcAft>
+                <a:spcPts val="400"/>
+              </a:spcAft>
+              <a:buClr>
+                <a:schemeClr val="accent1"/>
+              </a:buClr>
+              <a:buFont typeface="Calibri" pitchFamily="34" charset="0"/>
+              <a:buChar char="◦"/>
+              <a:defRPr sz="1400" kern="1200">
+                <a:solidFill>
+                  <a:schemeClr val="tx1">
+                    <a:lumMod val="75000"/>
+                    <a:lumOff val="25000"/>
+                  </a:schemeClr>
+                </a:solidFill>
+                <a:latin typeface="+mn-lt"/>
+                <a:ea typeface="+mn-ea"/>
+                <a:cs typeface="+mn-cs"/>
+              </a:defRPr>
+            </a:lvl5pPr>
+            <a:lvl6pPr marL="1100000" indent="-228600" algn="l" defTabSz="914400" rtl="0" eaLnBrk="1" latinLnBrk="0" hangingPunct="1">
+              <a:lnSpc>
+                <a:spcPct val="90000"/>
+              </a:lnSpc>
+              <a:spcBef>
+                <a:spcPts val="200"/>
+              </a:spcBef>
+              <a:spcAft>
+                <a:spcPts val="400"/>
+              </a:spcAft>
+              <a:buClr>
+                <a:schemeClr val="accent1"/>
+              </a:buClr>
+              <a:buFont typeface="Calibri" pitchFamily="34" charset="0"/>
+              <a:buChar char="◦"/>
+              <a:defRPr sz="1400" kern="1200">
+                <a:solidFill>
+                  <a:schemeClr val="tx1">
+                    <a:lumMod val="75000"/>
+                    <a:lumOff val="25000"/>
+                  </a:schemeClr>
+                </a:solidFill>
+                <a:latin typeface="+mn-lt"/>
+                <a:ea typeface="+mn-ea"/>
+                <a:cs typeface="+mn-cs"/>
+              </a:defRPr>
+            </a:lvl6pPr>
+            <a:lvl7pPr marL="1300000" indent="-228600" algn="l" defTabSz="914400" rtl="0" eaLnBrk="1" latinLnBrk="0" hangingPunct="1">
+              <a:lnSpc>
+                <a:spcPct val="90000"/>
+              </a:lnSpc>
+              <a:spcBef>
+                <a:spcPts val="200"/>
+              </a:spcBef>
+              <a:spcAft>
+                <a:spcPts val="400"/>
+              </a:spcAft>
+              <a:buClr>
+                <a:schemeClr val="accent1"/>
+              </a:buClr>
+              <a:buFont typeface="Calibri" pitchFamily="34" charset="0"/>
+              <a:buChar char="◦"/>
+              <a:defRPr sz="1400" kern="1200">
+                <a:solidFill>
+                  <a:schemeClr val="tx1">
+                    <a:lumMod val="75000"/>
+                    <a:lumOff val="25000"/>
+                  </a:schemeClr>
+                </a:solidFill>
+                <a:latin typeface="+mn-lt"/>
+                <a:ea typeface="+mn-ea"/>
+                <a:cs typeface="+mn-cs"/>
+              </a:defRPr>
+            </a:lvl7pPr>
+            <a:lvl8pPr marL="1500000" indent="-228600" algn="l" defTabSz="914400" rtl="0" eaLnBrk="1" latinLnBrk="0" hangingPunct="1">
+              <a:lnSpc>
+                <a:spcPct val="90000"/>
+              </a:lnSpc>
+              <a:spcBef>
+                <a:spcPts val="200"/>
+              </a:spcBef>
+              <a:spcAft>
+                <a:spcPts val="400"/>
+              </a:spcAft>
+              <a:buClr>
+                <a:schemeClr val="accent1"/>
+              </a:buClr>
+              <a:buFont typeface="Calibri" pitchFamily="34" charset="0"/>
+              <a:buChar char="◦"/>
+              <a:defRPr sz="1400" kern="1200">
+                <a:solidFill>
+                  <a:schemeClr val="tx1">
+                    <a:lumMod val="75000"/>
+                    <a:lumOff val="25000"/>
+                  </a:schemeClr>
+                </a:solidFill>
+                <a:latin typeface="+mn-lt"/>
+                <a:ea typeface="+mn-ea"/>
+                <a:cs typeface="+mn-cs"/>
+              </a:defRPr>
+            </a:lvl8pPr>
+            <a:lvl9pPr marL="1700000" indent="-228600" algn="l" defTabSz="914400" rtl="0" eaLnBrk="1" latinLnBrk="0" hangingPunct="1">
+              <a:lnSpc>
+                <a:spcPct val="90000"/>
+              </a:lnSpc>
+              <a:spcBef>
+                <a:spcPts val="200"/>
+              </a:spcBef>
+              <a:spcAft>
+                <a:spcPts val="400"/>
+              </a:spcAft>
+              <a:buClr>
+                <a:schemeClr val="accent1"/>
+              </a:buClr>
+              <a:buFont typeface="Calibri" pitchFamily="34" charset="0"/>
+              <a:buChar char="◦"/>
+              <a:defRPr sz="1400" kern="1200">
+                <a:solidFill>
+                  <a:schemeClr val="tx1">
+                    <a:lumMod val="75000"/>
+                    <a:lumOff val="25000"/>
+                  </a:schemeClr>
+                </a:solidFill>
+                <a:latin typeface="+mn-lt"/>
+                <a:ea typeface="+mn-ea"/>
+                <a:cs typeface="+mn-cs"/>
+              </a:defRPr>
+            </a:lvl9pPr>
+          </a:lstStyle>
+          <a:p>
+            <a:pPr marL="0" indent="0">
+              <a:buFont typeface="Calibri" panose="020F0502020204030204" pitchFamily="34" charset="0"/>
+              <a:buNone/>
+            </a:pPr>
+            <a:r>
+              <a:rPr lang="en-US" u="sng" dirty="0" err="1"/>
+              <a:t>tfidf</a:t>
+            </a:r>
+            <a:r>
+              <a:rPr lang="en-US" u="sng" dirty="0"/>
+              <a:t>(</a:t>
+            </a:r>
+            <a:r>
+              <a:rPr lang="en-US" u="sng" dirty="0" err="1"/>
+              <a:t>word+score</a:t>
+            </a:r>
+            <a:r>
+              <a:rPr lang="en-US" u="sng" dirty="0"/>
+              <a:t>)(1-3) </a:t>
+            </a:r>
+            <a:r>
+              <a:rPr lang="en-US" b="1" u="sng" dirty="0"/>
+              <a:t>15.493s</a:t>
+            </a:r>
+          </a:p>
+          <a:p>
+            <a:pPr marL="0" indent="0">
+              <a:buNone/>
+            </a:pPr>
+            <a:r>
+              <a:rPr lang="en-US" dirty="0"/>
+              <a:t>svc: 0.519064566296</a:t>
+            </a:r>
+          </a:p>
+          <a:p>
+            <a:pPr marL="0" indent="0">
+              <a:buNone/>
+            </a:pPr>
+            <a:r>
+              <a:rPr lang="en-US" dirty="0" err="1"/>
+              <a:t>gnb</a:t>
+            </a:r>
+            <a:r>
+              <a:rPr lang="en-US" dirty="0"/>
+              <a:t>: 0.59594614386</a:t>
+            </a:r>
+          </a:p>
+          <a:p>
+            <a:pPr marL="0" indent="0">
+              <a:buNone/>
+            </a:pPr>
+            <a:r>
+              <a:rPr lang="en-US" dirty="0" err="1"/>
+              <a:t>lgr</a:t>
+            </a:r>
+            <a:r>
+              <a:rPr lang="en-US" dirty="0"/>
+              <a:t>: 0.520354460224</a:t>
+            </a:r>
+          </a:p>
+          <a:p>
+            <a:pPr marL="0" indent="0">
+              <a:buNone/>
+            </a:pPr>
+            <a:r>
+              <a:rPr lang="en-US" b="1" dirty="0" err="1">
+                <a:solidFill>
+                  <a:srgbClr val="FF0000"/>
+                </a:solidFill>
+              </a:rPr>
+              <a:t>sgd</a:t>
+            </a:r>
+            <a:r>
+              <a:rPr lang="en-US" b="1" dirty="0">
+                <a:solidFill>
+                  <a:srgbClr val="FF0000"/>
+                </a:solidFill>
+              </a:rPr>
+              <a:t>: 0.642713979644</a:t>
+            </a:r>
+          </a:p>
+          <a:p>
+            <a:pPr marL="0" indent="0">
+              <a:buNone/>
+            </a:pPr>
+            <a:r>
+              <a:rPr lang="en-US" dirty="0" err="1"/>
+              <a:t>knn</a:t>
+            </a:r>
+            <a:r>
+              <a:rPr lang="en-US" dirty="0"/>
+              <a:t>: 0.541998670405</a:t>
+            </a:r>
+          </a:p>
+          <a:p>
+            <a:pPr marL="0" indent="0">
+              <a:buNone/>
+            </a:pPr>
+            <a:r>
+              <a:rPr lang="en-US" dirty="0" err="1"/>
+              <a:t>dtc</a:t>
+            </a:r>
+            <a:r>
+              <a:rPr lang="en-US" dirty="0"/>
+              <a:t>: 0.472733477694</a:t>
+            </a:r>
+          </a:p>
+          <a:p>
+            <a:pPr marL="0" indent="0">
+              <a:buNone/>
+            </a:pPr>
+            <a:r>
+              <a:rPr lang="en-US" dirty="0" err="1"/>
+              <a:t>rfc</a:t>
+            </a:r>
+            <a:r>
+              <a:rPr lang="en-US" dirty="0"/>
+              <a:t>: 0.4963818842</a:t>
+            </a:r>
+          </a:p>
+          <a:p>
+            <a:pPr marL="0" indent="0">
+              <a:buNone/>
+            </a:pPr>
+            <a:r>
+              <a:rPr lang="en-US" dirty="0"/>
+              <a:t>soft </a:t>
+            </a:r>
+            <a:r>
+              <a:rPr lang="en-US" dirty="0" err="1"/>
+              <a:t>voc</a:t>
+            </a:r>
+            <a:r>
+              <a:rPr lang="en-US" dirty="0"/>
+              <a:t>: 0.55935552889</a:t>
+            </a:r>
+          </a:p>
+          <a:p>
+            <a:pPr marL="0" indent="0">
+              <a:buNone/>
+            </a:pPr>
+            <a:r>
+              <a:rPr lang="en-US" dirty="0"/>
+              <a:t>hard </a:t>
+            </a:r>
+            <a:r>
+              <a:rPr lang="en-US" dirty="0" err="1"/>
+              <a:t>voc</a:t>
+            </a:r>
+            <a:r>
+              <a:rPr lang="en-US" dirty="0"/>
+              <a:t>: 0.573636373611</a:t>
+            </a:r>
+          </a:p>
+        </p:txBody>
+      </p:sp>
+      <p:sp>
+        <p:nvSpPr>
+          <p:cNvPr id="5" name="Content Placeholder 2"/>
+          <p:cNvSpPr txBox="1">
+            <a:spLocks/>
+          </p:cNvSpPr>
+          <p:nvPr/>
+        </p:nvSpPr>
+        <p:spPr>
+          <a:xfrm>
+            <a:off x="4412609" y="1845734"/>
+            <a:ext cx="3315330" cy="4023360"/>
+          </a:xfrm>
+          <a:prstGeom prst="rect">
+            <a:avLst/>
+          </a:prstGeom>
+        </p:spPr>
+        <p:txBody>
+          <a:bodyPr vert="horz" lIns="0" tIns="45720" rIns="0" bIns="45720" rtlCol="0">
+            <a:normAutofit fontScale="92500" lnSpcReduction="10000"/>
+          </a:bodyPr>
+          <a:lstStyle>
+            <a:lvl1pPr marL="91440" indent="-91440" algn="l" defTabSz="914400" rtl="0" eaLnBrk="1" latinLnBrk="0" hangingPunct="1">
+              <a:lnSpc>
+                <a:spcPct val="90000"/>
+              </a:lnSpc>
+              <a:spcBef>
+                <a:spcPts val="1200"/>
+              </a:spcBef>
+              <a:spcAft>
+                <a:spcPts val="200"/>
+              </a:spcAft>
+              <a:buClr>
+                <a:schemeClr val="accent1"/>
+              </a:buClr>
+              <a:buSzPct val="100000"/>
+              <a:buFont typeface="Calibri" panose="020F0502020204030204" pitchFamily="34" charset="0"/>
+              <a:buChar char=" "/>
+              <a:defRPr sz="2000" kern="1200">
+                <a:solidFill>
+                  <a:schemeClr val="tx1">
+                    <a:lumMod val="75000"/>
+                    <a:lumOff val="25000"/>
+                  </a:schemeClr>
+                </a:solidFill>
+                <a:latin typeface="+mn-lt"/>
+                <a:ea typeface="+mn-ea"/>
+                <a:cs typeface="+mn-cs"/>
+              </a:defRPr>
+            </a:lvl1pPr>
+            <a:lvl2pPr marL="384048" indent="-182880" algn="l" defTabSz="914400" rtl="0" eaLnBrk="1" latinLnBrk="0" hangingPunct="1">
+              <a:lnSpc>
+                <a:spcPct val="90000"/>
+              </a:lnSpc>
+              <a:spcBef>
+                <a:spcPts val="200"/>
+              </a:spcBef>
+              <a:spcAft>
+                <a:spcPts val="400"/>
+              </a:spcAft>
+              <a:buClr>
+                <a:schemeClr val="accent1"/>
+              </a:buClr>
+              <a:buFont typeface="Calibri" pitchFamily="34" charset="0"/>
+              <a:buChar char="◦"/>
+              <a:defRPr sz="1800" kern="1200">
+                <a:solidFill>
+                  <a:schemeClr val="tx1">
+                    <a:lumMod val="75000"/>
+                    <a:lumOff val="25000"/>
+                  </a:schemeClr>
+                </a:solidFill>
+                <a:latin typeface="+mn-lt"/>
+                <a:ea typeface="+mn-ea"/>
+                <a:cs typeface="+mn-cs"/>
+              </a:defRPr>
+            </a:lvl2pPr>
+            <a:lvl3pPr marL="566928" indent="-182880" algn="l" defTabSz="914400" rtl="0" eaLnBrk="1" latinLnBrk="0" hangingPunct="1">
+              <a:lnSpc>
+                <a:spcPct val="90000"/>
+              </a:lnSpc>
+              <a:spcBef>
+                <a:spcPts val="200"/>
+              </a:spcBef>
+              <a:spcAft>
+                <a:spcPts val="400"/>
+              </a:spcAft>
+              <a:buClr>
+                <a:schemeClr val="accent1"/>
+              </a:buClr>
+              <a:buFont typeface="Calibri" pitchFamily="34" charset="0"/>
+              <a:buChar char="◦"/>
+              <a:defRPr sz="1400" kern="1200">
+                <a:solidFill>
+                  <a:schemeClr val="tx1">
+                    <a:lumMod val="75000"/>
+                    <a:lumOff val="25000"/>
+                  </a:schemeClr>
+                </a:solidFill>
+                <a:latin typeface="+mn-lt"/>
+                <a:ea typeface="+mn-ea"/>
+                <a:cs typeface="+mn-cs"/>
+              </a:defRPr>
+            </a:lvl3pPr>
+            <a:lvl4pPr marL="749808" indent="-182880" algn="l" defTabSz="914400" rtl="0" eaLnBrk="1" latinLnBrk="0" hangingPunct="1">
+              <a:lnSpc>
+                <a:spcPct val="90000"/>
+              </a:lnSpc>
+              <a:spcBef>
+                <a:spcPts val="200"/>
+              </a:spcBef>
+              <a:spcAft>
+                <a:spcPts val="400"/>
+              </a:spcAft>
+              <a:buClr>
+                <a:schemeClr val="accent1"/>
+              </a:buClr>
+              <a:buFont typeface="Calibri" pitchFamily="34" charset="0"/>
+              <a:buChar char="◦"/>
+              <a:defRPr sz="1400" kern="1200">
+                <a:solidFill>
+                  <a:schemeClr val="tx1">
+                    <a:lumMod val="75000"/>
+                    <a:lumOff val="25000"/>
+                  </a:schemeClr>
+                </a:solidFill>
+                <a:latin typeface="+mn-lt"/>
+                <a:ea typeface="+mn-ea"/>
+                <a:cs typeface="+mn-cs"/>
+              </a:defRPr>
+            </a:lvl4pPr>
+            <a:lvl5pPr marL="932688" indent="-182880" algn="l" defTabSz="914400" rtl="0" eaLnBrk="1" latinLnBrk="0" hangingPunct="1">
+              <a:lnSpc>
+                <a:spcPct val="90000"/>
+              </a:lnSpc>
+              <a:spcBef>
+                <a:spcPts val="200"/>
+              </a:spcBef>
+              <a:spcAft>
+                <a:spcPts val="400"/>
+              </a:spcAft>
+              <a:buClr>
+                <a:schemeClr val="accent1"/>
+              </a:buClr>
+              <a:buFont typeface="Calibri" pitchFamily="34" charset="0"/>
+              <a:buChar char="◦"/>
+              <a:defRPr sz="1400" kern="1200">
+                <a:solidFill>
+                  <a:schemeClr val="tx1">
+                    <a:lumMod val="75000"/>
+                    <a:lumOff val="25000"/>
+                  </a:schemeClr>
+                </a:solidFill>
+                <a:latin typeface="+mn-lt"/>
+                <a:ea typeface="+mn-ea"/>
+                <a:cs typeface="+mn-cs"/>
+              </a:defRPr>
+            </a:lvl5pPr>
+            <a:lvl6pPr marL="1100000" indent="-228600" algn="l" defTabSz="914400" rtl="0" eaLnBrk="1" latinLnBrk="0" hangingPunct="1">
+              <a:lnSpc>
+                <a:spcPct val="90000"/>
+              </a:lnSpc>
+              <a:spcBef>
+                <a:spcPts val="200"/>
+              </a:spcBef>
+              <a:spcAft>
+                <a:spcPts val="400"/>
+              </a:spcAft>
+              <a:buClr>
+                <a:schemeClr val="accent1"/>
+              </a:buClr>
+              <a:buFont typeface="Calibri" pitchFamily="34" charset="0"/>
+              <a:buChar char="◦"/>
+              <a:defRPr sz="1400" kern="1200">
+                <a:solidFill>
+                  <a:schemeClr val="tx1">
+                    <a:lumMod val="75000"/>
+                    <a:lumOff val="25000"/>
+                  </a:schemeClr>
+                </a:solidFill>
+                <a:latin typeface="+mn-lt"/>
+                <a:ea typeface="+mn-ea"/>
+                <a:cs typeface="+mn-cs"/>
+              </a:defRPr>
+            </a:lvl6pPr>
+            <a:lvl7pPr marL="1300000" indent="-228600" algn="l" defTabSz="914400" rtl="0" eaLnBrk="1" latinLnBrk="0" hangingPunct="1">
+              <a:lnSpc>
+                <a:spcPct val="90000"/>
+              </a:lnSpc>
+              <a:spcBef>
+                <a:spcPts val="200"/>
+              </a:spcBef>
+              <a:spcAft>
+                <a:spcPts val="400"/>
+              </a:spcAft>
+              <a:buClr>
+                <a:schemeClr val="accent1"/>
+              </a:buClr>
+              <a:buFont typeface="Calibri" pitchFamily="34" charset="0"/>
+              <a:buChar char="◦"/>
+              <a:defRPr sz="1400" kern="1200">
+                <a:solidFill>
+                  <a:schemeClr val="tx1">
+                    <a:lumMod val="75000"/>
+                    <a:lumOff val="25000"/>
+                  </a:schemeClr>
+                </a:solidFill>
+                <a:latin typeface="+mn-lt"/>
+                <a:ea typeface="+mn-ea"/>
+                <a:cs typeface="+mn-cs"/>
+              </a:defRPr>
+            </a:lvl7pPr>
+            <a:lvl8pPr marL="1500000" indent="-228600" algn="l" defTabSz="914400" rtl="0" eaLnBrk="1" latinLnBrk="0" hangingPunct="1">
+              <a:lnSpc>
+                <a:spcPct val="90000"/>
+              </a:lnSpc>
+              <a:spcBef>
+                <a:spcPts val="200"/>
+              </a:spcBef>
+              <a:spcAft>
+                <a:spcPts val="400"/>
+              </a:spcAft>
+              <a:buClr>
+                <a:schemeClr val="accent1"/>
+              </a:buClr>
+              <a:buFont typeface="Calibri" pitchFamily="34" charset="0"/>
+              <a:buChar char="◦"/>
+              <a:defRPr sz="1400" kern="1200">
+                <a:solidFill>
+                  <a:schemeClr val="tx1">
+                    <a:lumMod val="75000"/>
+                    <a:lumOff val="25000"/>
+                  </a:schemeClr>
+                </a:solidFill>
+                <a:latin typeface="+mn-lt"/>
+                <a:ea typeface="+mn-ea"/>
+                <a:cs typeface="+mn-cs"/>
+              </a:defRPr>
+            </a:lvl8pPr>
+            <a:lvl9pPr marL="1700000" indent="-228600" algn="l" defTabSz="914400" rtl="0" eaLnBrk="1" latinLnBrk="0" hangingPunct="1">
+              <a:lnSpc>
+                <a:spcPct val="90000"/>
+              </a:lnSpc>
+              <a:spcBef>
+                <a:spcPts val="200"/>
+              </a:spcBef>
+              <a:spcAft>
+                <a:spcPts val="400"/>
+              </a:spcAft>
+              <a:buClr>
+                <a:schemeClr val="accent1"/>
+              </a:buClr>
+              <a:buFont typeface="Calibri" pitchFamily="34" charset="0"/>
+              <a:buChar char="◦"/>
+              <a:defRPr sz="1400" kern="1200">
+                <a:solidFill>
+                  <a:schemeClr val="tx1">
+                    <a:lumMod val="75000"/>
+                    <a:lumOff val="25000"/>
+                  </a:schemeClr>
+                </a:solidFill>
+                <a:latin typeface="+mn-lt"/>
+                <a:ea typeface="+mn-ea"/>
+                <a:cs typeface="+mn-cs"/>
+              </a:defRPr>
+            </a:lvl9pPr>
+          </a:lstStyle>
+          <a:p>
+            <a:pPr marL="0" indent="0">
+              <a:buFont typeface="Calibri" panose="020F0502020204030204" pitchFamily="34" charset="0"/>
+              <a:buNone/>
+            </a:pPr>
+            <a:r>
+              <a:rPr lang="en-US" u="sng" dirty="0" err="1"/>
+              <a:t>tfidf</a:t>
+            </a:r>
+            <a:r>
+              <a:rPr lang="en-US" u="sng" dirty="0"/>
+              <a:t>(</a:t>
+            </a:r>
+            <a:r>
+              <a:rPr lang="en-US" u="sng" dirty="0" err="1"/>
+              <a:t>char+score</a:t>
+            </a:r>
+            <a:r>
+              <a:rPr lang="en-US" u="sng" dirty="0"/>
+              <a:t>)(1-4) </a:t>
+            </a:r>
+            <a:r>
+              <a:rPr lang="en-US" b="1" u="sng" dirty="0"/>
+              <a:t>21.516s</a:t>
+            </a:r>
+          </a:p>
+          <a:p>
+            <a:pPr marL="0" indent="0">
+              <a:buNone/>
+            </a:pPr>
+            <a:r>
+              <a:rPr lang="en-US" dirty="0"/>
+              <a:t>svc: 0.569200893497</a:t>
+            </a:r>
+          </a:p>
+          <a:p>
+            <a:pPr marL="0" indent="0">
+              <a:buNone/>
+            </a:pPr>
+            <a:r>
+              <a:rPr lang="en-US" b="1" dirty="0" err="1">
+                <a:solidFill>
+                  <a:srgbClr val="FF0000"/>
+                </a:solidFill>
+              </a:rPr>
+              <a:t>gnb</a:t>
+            </a:r>
+            <a:r>
+              <a:rPr lang="en-US" b="1" dirty="0">
+                <a:solidFill>
+                  <a:srgbClr val="FF0000"/>
+                </a:solidFill>
+              </a:rPr>
+              <a:t>: 0.635151969981</a:t>
+            </a:r>
+          </a:p>
+          <a:p>
+            <a:pPr marL="0" indent="0">
+              <a:buNone/>
+            </a:pPr>
+            <a:r>
+              <a:rPr lang="en-US" dirty="0" err="1"/>
+              <a:t>lgr</a:t>
+            </a:r>
+            <a:r>
+              <a:rPr lang="en-US" dirty="0"/>
+              <a:t>: 0.577686740766</a:t>
+            </a:r>
+          </a:p>
+          <a:p>
+            <a:pPr marL="0" indent="0">
+              <a:buNone/>
+            </a:pPr>
+            <a:r>
+              <a:rPr lang="en-US" dirty="0" err="1"/>
+              <a:t>sgd</a:t>
+            </a:r>
+            <a:r>
+              <a:rPr lang="en-US" dirty="0"/>
+              <a:t>: 0.536354228685</a:t>
+            </a:r>
+          </a:p>
+          <a:p>
+            <a:pPr marL="0" indent="0">
+              <a:buNone/>
+            </a:pPr>
+            <a:r>
+              <a:rPr lang="en-US" dirty="0" err="1"/>
+              <a:t>knn</a:t>
+            </a:r>
+            <a:r>
+              <a:rPr lang="en-US" dirty="0"/>
+              <a:t>: 0.546332346768</a:t>
+            </a:r>
+          </a:p>
+          <a:p>
+            <a:pPr marL="0" indent="0">
+              <a:buNone/>
+            </a:pPr>
+            <a:r>
+              <a:rPr lang="en-US" dirty="0" err="1"/>
+              <a:t>dtc</a:t>
+            </a:r>
+            <a:r>
+              <a:rPr lang="en-US" dirty="0"/>
+              <a:t>: 0.587154029445</a:t>
+            </a:r>
+          </a:p>
+          <a:p>
+            <a:pPr marL="0" indent="0">
+              <a:buNone/>
+            </a:pPr>
+            <a:r>
+              <a:rPr lang="en-US" dirty="0" err="1"/>
+              <a:t>rfc</a:t>
+            </a:r>
+            <a:r>
+              <a:rPr lang="en-US" dirty="0"/>
+              <a:t>: 0.491128224627</a:t>
+            </a:r>
+          </a:p>
+          <a:p>
+            <a:pPr marL="0" indent="0">
+              <a:buNone/>
+            </a:pPr>
+            <a:r>
+              <a:rPr lang="en-US" dirty="0"/>
+              <a:t>soft </a:t>
+            </a:r>
+            <a:r>
+              <a:rPr lang="en-US" dirty="0" err="1"/>
+              <a:t>voc</a:t>
+            </a:r>
+            <a:r>
+              <a:rPr lang="en-US" dirty="0"/>
+              <a:t>: 0.6133339599</a:t>
+            </a:r>
+          </a:p>
+          <a:p>
+            <a:pPr marL="0" indent="0">
+              <a:buNone/>
+            </a:pPr>
+            <a:r>
+              <a:rPr lang="en-US" dirty="0"/>
+              <a:t>hard </a:t>
+            </a:r>
+            <a:r>
+              <a:rPr lang="en-US" dirty="0" err="1"/>
+              <a:t>voc</a:t>
+            </a:r>
+            <a:r>
+              <a:rPr lang="en-US" dirty="0"/>
+              <a:t>: 0.613755190686</a:t>
+            </a:r>
+          </a:p>
+        </p:txBody>
+      </p:sp>
+      <p:sp>
+        <p:nvSpPr>
+          <p:cNvPr id="6" name="Content Placeholder 2"/>
+          <p:cNvSpPr txBox="1">
+            <a:spLocks/>
+          </p:cNvSpPr>
+          <p:nvPr/>
+        </p:nvSpPr>
+        <p:spPr>
+          <a:xfrm>
+            <a:off x="7727939" y="1845734"/>
+            <a:ext cx="3572032" cy="4023360"/>
+          </a:xfrm>
+          <a:prstGeom prst="rect">
+            <a:avLst/>
+          </a:prstGeom>
+        </p:spPr>
+        <p:txBody>
+          <a:bodyPr vert="horz" lIns="0" tIns="45720" rIns="0" bIns="45720" rtlCol="0">
+            <a:normAutofit fontScale="92500" lnSpcReduction="10000"/>
+          </a:bodyPr>
+          <a:lstStyle>
+            <a:lvl1pPr marL="91440" indent="-91440" algn="l" defTabSz="914400" rtl="0" eaLnBrk="1" latinLnBrk="0" hangingPunct="1">
+              <a:lnSpc>
+                <a:spcPct val="90000"/>
+              </a:lnSpc>
+              <a:spcBef>
+                <a:spcPts val="1200"/>
+              </a:spcBef>
+              <a:spcAft>
+                <a:spcPts val="200"/>
+              </a:spcAft>
+              <a:buClr>
+                <a:schemeClr val="accent1"/>
+              </a:buClr>
+              <a:buSzPct val="100000"/>
+              <a:buFont typeface="Calibri" panose="020F0502020204030204" pitchFamily="34" charset="0"/>
+              <a:buChar char=" "/>
+              <a:defRPr sz="2000" kern="1200">
+                <a:solidFill>
+                  <a:schemeClr val="tx1">
+                    <a:lumMod val="75000"/>
+                    <a:lumOff val="25000"/>
+                  </a:schemeClr>
+                </a:solidFill>
+                <a:latin typeface="+mn-lt"/>
+                <a:ea typeface="+mn-ea"/>
+                <a:cs typeface="+mn-cs"/>
+              </a:defRPr>
+            </a:lvl1pPr>
+            <a:lvl2pPr marL="384048" indent="-182880" algn="l" defTabSz="914400" rtl="0" eaLnBrk="1" latinLnBrk="0" hangingPunct="1">
+              <a:lnSpc>
+                <a:spcPct val="90000"/>
+              </a:lnSpc>
+              <a:spcBef>
+                <a:spcPts val="200"/>
+              </a:spcBef>
+              <a:spcAft>
+                <a:spcPts val="400"/>
+              </a:spcAft>
+              <a:buClr>
+                <a:schemeClr val="accent1"/>
+              </a:buClr>
+              <a:buFont typeface="Calibri" pitchFamily="34" charset="0"/>
+              <a:buChar char="◦"/>
+              <a:defRPr sz="1800" kern="1200">
+                <a:solidFill>
+                  <a:schemeClr val="tx1">
+                    <a:lumMod val="75000"/>
+                    <a:lumOff val="25000"/>
+                  </a:schemeClr>
+                </a:solidFill>
+                <a:latin typeface="+mn-lt"/>
+                <a:ea typeface="+mn-ea"/>
+                <a:cs typeface="+mn-cs"/>
+              </a:defRPr>
+            </a:lvl2pPr>
+            <a:lvl3pPr marL="566928" indent="-182880" algn="l" defTabSz="914400" rtl="0" eaLnBrk="1" latinLnBrk="0" hangingPunct="1">
+              <a:lnSpc>
+                <a:spcPct val="90000"/>
+              </a:lnSpc>
+              <a:spcBef>
+                <a:spcPts val="200"/>
+              </a:spcBef>
+              <a:spcAft>
+                <a:spcPts val="400"/>
+              </a:spcAft>
+              <a:buClr>
+                <a:schemeClr val="accent1"/>
+              </a:buClr>
+              <a:buFont typeface="Calibri" pitchFamily="34" charset="0"/>
+              <a:buChar char="◦"/>
+              <a:defRPr sz="1400" kern="1200">
+                <a:solidFill>
+                  <a:schemeClr val="tx1">
+                    <a:lumMod val="75000"/>
+                    <a:lumOff val="25000"/>
+                  </a:schemeClr>
+                </a:solidFill>
+                <a:latin typeface="+mn-lt"/>
+                <a:ea typeface="+mn-ea"/>
+                <a:cs typeface="+mn-cs"/>
+              </a:defRPr>
+            </a:lvl3pPr>
+            <a:lvl4pPr marL="749808" indent="-182880" algn="l" defTabSz="914400" rtl="0" eaLnBrk="1" latinLnBrk="0" hangingPunct="1">
+              <a:lnSpc>
+                <a:spcPct val="90000"/>
+              </a:lnSpc>
+              <a:spcBef>
+                <a:spcPts val="200"/>
+              </a:spcBef>
+              <a:spcAft>
+                <a:spcPts val="400"/>
+              </a:spcAft>
+              <a:buClr>
+                <a:schemeClr val="accent1"/>
+              </a:buClr>
+              <a:buFont typeface="Calibri" pitchFamily="34" charset="0"/>
+              <a:buChar char="◦"/>
+              <a:defRPr sz="1400" kern="1200">
+                <a:solidFill>
+                  <a:schemeClr val="tx1">
+                    <a:lumMod val="75000"/>
+                    <a:lumOff val="25000"/>
+                  </a:schemeClr>
+                </a:solidFill>
+                <a:latin typeface="+mn-lt"/>
+                <a:ea typeface="+mn-ea"/>
+                <a:cs typeface="+mn-cs"/>
+              </a:defRPr>
+            </a:lvl4pPr>
+            <a:lvl5pPr marL="932688" indent="-182880" algn="l" defTabSz="914400" rtl="0" eaLnBrk="1" latinLnBrk="0" hangingPunct="1">
+              <a:lnSpc>
+                <a:spcPct val="90000"/>
+              </a:lnSpc>
+              <a:spcBef>
+                <a:spcPts val="200"/>
+              </a:spcBef>
+              <a:spcAft>
+                <a:spcPts val="400"/>
+              </a:spcAft>
+              <a:buClr>
+                <a:schemeClr val="accent1"/>
+              </a:buClr>
+              <a:buFont typeface="Calibri" pitchFamily="34" charset="0"/>
+              <a:buChar char="◦"/>
+              <a:defRPr sz="1400" kern="1200">
+                <a:solidFill>
+                  <a:schemeClr val="tx1">
+                    <a:lumMod val="75000"/>
+                    <a:lumOff val="25000"/>
+                  </a:schemeClr>
+                </a:solidFill>
+                <a:latin typeface="+mn-lt"/>
+                <a:ea typeface="+mn-ea"/>
+                <a:cs typeface="+mn-cs"/>
+              </a:defRPr>
+            </a:lvl5pPr>
+            <a:lvl6pPr marL="1100000" indent="-228600" algn="l" defTabSz="914400" rtl="0" eaLnBrk="1" latinLnBrk="0" hangingPunct="1">
+              <a:lnSpc>
+                <a:spcPct val="90000"/>
+              </a:lnSpc>
+              <a:spcBef>
+                <a:spcPts val="200"/>
+              </a:spcBef>
+              <a:spcAft>
+                <a:spcPts val="400"/>
+              </a:spcAft>
+              <a:buClr>
+                <a:schemeClr val="accent1"/>
+              </a:buClr>
+              <a:buFont typeface="Calibri" pitchFamily="34" charset="0"/>
+              <a:buChar char="◦"/>
+              <a:defRPr sz="1400" kern="1200">
+                <a:solidFill>
+                  <a:schemeClr val="tx1">
+                    <a:lumMod val="75000"/>
+                    <a:lumOff val="25000"/>
+                  </a:schemeClr>
+                </a:solidFill>
+                <a:latin typeface="+mn-lt"/>
+                <a:ea typeface="+mn-ea"/>
+                <a:cs typeface="+mn-cs"/>
+              </a:defRPr>
+            </a:lvl6pPr>
+            <a:lvl7pPr marL="1300000" indent="-228600" algn="l" defTabSz="914400" rtl="0" eaLnBrk="1" latinLnBrk="0" hangingPunct="1">
+              <a:lnSpc>
+                <a:spcPct val="90000"/>
+              </a:lnSpc>
+              <a:spcBef>
+                <a:spcPts val="200"/>
+              </a:spcBef>
+              <a:spcAft>
+                <a:spcPts val="400"/>
+              </a:spcAft>
+              <a:buClr>
+                <a:schemeClr val="accent1"/>
+              </a:buClr>
+              <a:buFont typeface="Calibri" pitchFamily="34" charset="0"/>
+              <a:buChar char="◦"/>
+              <a:defRPr sz="1400" kern="1200">
+                <a:solidFill>
+                  <a:schemeClr val="tx1">
+                    <a:lumMod val="75000"/>
+                    <a:lumOff val="25000"/>
+                  </a:schemeClr>
+                </a:solidFill>
+                <a:latin typeface="+mn-lt"/>
+                <a:ea typeface="+mn-ea"/>
+                <a:cs typeface="+mn-cs"/>
+              </a:defRPr>
+            </a:lvl7pPr>
+            <a:lvl8pPr marL="1500000" indent="-228600" algn="l" defTabSz="914400" rtl="0" eaLnBrk="1" latinLnBrk="0" hangingPunct="1">
+              <a:lnSpc>
+                <a:spcPct val="90000"/>
+              </a:lnSpc>
+              <a:spcBef>
+                <a:spcPts val="200"/>
+              </a:spcBef>
+              <a:spcAft>
+                <a:spcPts val="400"/>
+              </a:spcAft>
+              <a:buClr>
+                <a:schemeClr val="accent1"/>
+              </a:buClr>
+              <a:buFont typeface="Calibri" pitchFamily="34" charset="0"/>
+              <a:buChar char="◦"/>
+              <a:defRPr sz="1400" kern="1200">
+                <a:solidFill>
+                  <a:schemeClr val="tx1">
+                    <a:lumMod val="75000"/>
+                    <a:lumOff val="25000"/>
+                  </a:schemeClr>
+                </a:solidFill>
+                <a:latin typeface="+mn-lt"/>
+                <a:ea typeface="+mn-ea"/>
+                <a:cs typeface="+mn-cs"/>
+              </a:defRPr>
+            </a:lvl8pPr>
+            <a:lvl9pPr marL="1700000" indent="-228600" algn="l" defTabSz="914400" rtl="0" eaLnBrk="1" latinLnBrk="0" hangingPunct="1">
+              <a:lnSpc>
+                <a:spcPct val="90000"/>
+              </a:lnSpc>
+              <a:spcBef>
+                <a:spcPts val="200"/>
+              </a:spcBef>
+              <a:spcAft>
+                <a:spcPts val="400"/>
+              </a:spcAft>
+              <a:buClr>
+                <a:schemeClr val="accent1"/>
+              </a:buClr>
+              <a:buFont typeface="Calibri" pitchFamily="34" charset="0"/>
+              <a:buChar char="◦"/>
+              <a:defRPr sz="1400" kern="1200">
+                <a:solidFill>
+                  <a:schemeClr val="tx1">
+                    <a:lumMod val="75000"/>
+                    <a:lumOff val="25000"/>
+                  </a:schemeClr>
+                </a:solidFill>
+                <a:latin typeface="+mn-lt"/>
+                <a:ea typeface="+mn-ea"/>
+                <a:cs typeface="+mn-cs"/>
+              </a:defRPr>
+            </a:lvl9pPr>
+          </a:lstStyle>
+          <a:p>
+            <a:pPr marL="0" indent="0">
+              <a:buFont typeface="Calibri" panose="020F0502020204030204" pitchFamily="34" charset="0"/>
+              <a:buNone/>
+            </a:pPr>
+            <a:r>
+              <a:rPr lang="en-US" u="sng" dirty="0" err="1"/>
+              <a:t>tfidf</a:t>
+            </a:r>
+            <a:r>
+              <a:rPr lang="en-US" u="sng" dirty="0"/>
+              <a:t>(</a:t>
+            </a:r>
+            <a:r>
+              <a:rPr lang="en-US" u="sng" dirty="0" err="1"/>
+              <a:t>char_wb+score</a:t>
+            </a:r>
+            <a:r>
+              <a:rPr lang="en-US" u="sng" dirty="0"/>
+              <a:t>)(1-4) </a:t>
+            </a:r>
+            <a:r>
+              <a:rPr lang="en-US" b="1" u="sng" dirty="0"/>
+              <a:t>13.687s</a:t>
+            </a:r>
+          </a:p>
+          <a:p>
+            <a:pPr marL="0" indent="0">
+              <a:buNone/>
+            </a:pPr>
+            <a:r>
+              <a:rPr lang="en-US" dirty="0"/>
+              <a:t>svc: 0.555067332602</a:t>
+            </a:r>
+          </a:p>
+          <a:p>
+            <a:pPr marL="0" indent="0">
+              <a:buNone/>
+            </a:pPr>
+            <a:r>
+              <a:rPr lang="en-US" dirty="0" err="1"/>
+              <a:t>gnb</a:t>
+            </a:r>
+            <a:r>
+              <a:rPr lang="en-US" dirty="0"/>
+              <a:t>: 0.60772945497</a:t>
+            </a:r>
+          </a:p>
+          <a:p>
+            <a:pPr marL="0" indent="0">
+              <a:buNone/>
+            </a:pPr>
+            <a:r>
+              <a:rPr lang="en-US" dirty="0" err="1"/>
+              <a:t>lgr</a:t>
+            </a:r>
+            <a:r>
+              <a:rPr lang="en-US" dirty="0"/>
+              <a:t>: 0.540404076944</a:t>
+            </a:r>
+          </a:p>
+          <a:p>
+            <a:pPr marL="0" indent="0">
+              <a:buNone/>
+            </a:pPr>
+            <a:r>
+              <a:rPr lang="en-US" dirty="0" err="1"/>
+              <a:t>sgd</a:t>
+            </a:r>
+            <a:r>
+              <a:rPr lang="en-US" dirty="0"/>
+              <a:t>: 0.548920894017</a:t>
+            </a:r>
+          </a:p>
+          <a:p>
+            <a:pPr marL="0" indent="0">
+              <a:buNone/>
+            </a:pPr>
+            <a:r>
+              <a:rPr lang="en-US" dirty="0" err="1"/>
+              <a:t>knn</a:t>
+            </a:r>
+            <a:r>
+              <a:rPr lang="en-US" dirty="0"/>
+              <a:t>: 0.543829672625</a:t>
+            </a:r>
+          </a:p>
+          <a:p>
+            <a:pPr marL="0" indent="0">
+              <a:buNone/>
+            </a:pPr>
+            <a:r>
+              <a:rPr lang="en-US" dirty="0" err="1"/>
+              <a:t>dtc</a:t>
+            </a:r>
+            <a:r>
+              <a:rPr lang="en-US" dirty="0"/>
+              <a:t>: 0.566337112722</a:t>
+            </a:r>
+          </a:p>
+          <a:p>
+            <a:pPr marL="0" indent="0">
+              <a:buNone/>
+            </a:pPr>
+            <a:r>
+              <a:rPr lang="en-US" dirty="0" err="1"/>
+              <a:t>rfc</a:t>
+            </a:r>
+            <a:r>
+              <a:rPr lang="en-US" dirty="0"/>
+              <a:t>: 0.598614631165</a:t>
+            </a:r>
+          </a:p>
+          <a:p>
+            <a:pPr marL="0" indent="0">
+              <a:buNone/>
+            </a:pPr>
+            <a:r>
+              <a:rPr lang="en-US" b="1" dirty="0">
+                <a:solidFill>
+                  <a:srgbClr val="FF0000"/>
+                </a:solidFill>
+              </a:rPr>
+              <a:t>soft </a:t>
+            </a:r>
+            <a:r>
+              <a:rPr lang="en-US" b="1" dirty="0" err="1">
+                <a:solidFill>
+                  <a:srgbClr val="FF0000"/>
+                </a:solidFill>
+              </a:rPr>
+              <a:t>voc</a:t>
+            </a:r>
+            <a:r>
+              <a:rPr lang="en-US" b="1" dirty="0">
+                <a:solidFill>
+                  <a:srgbClr val="FF0000"/>
+                </a:solidFill>
+              </a:rPr>
+              <a:t>: 0.645151324792</a:t>
+            </a:r>
+          </a:p>
+          <a:p>
+            <a:pPr marL="0" indent="0">
+              <a:buNone/>
+            </a:pPr>
+            <a:r>
+              <a:rPr lang="en-US" dirty="0"/>
+              <a:t>hard </a:t>
+            </a:r>
+            <a:r>
+              <a:rPr lang="en-US" dirty="0" err="1"/>
+              <a:t>voc</a:t>
+            </a:r>
+            <a:r>
+              <a:rPr lang="en-US" dirty="0"/>
+              <a:t>: 0.598973556753</a:t>
+            </a:r>
+          </a:p>
+        </p:txBody>
+      </p:sp>
+    </p:spTree>
+    <p:extLst>
+      <p:ext uri="{BB962C8B-B14F-4D97-AF65-F5344CB8AC3E}">
+        <p14:creationId xmlns:p14="http://schemas.microsoft.com/office/powerpoint/2010/main" val="493863830"/>
+      </p:ext>
+    </p:extLst>
+  </p:cSld>
+  <p:clrMapOvr>
+    <a:masterClrMapping/>
+  </p:clrMapOvr>
+</p:sld>
+</file>
+
+<file path=ppt/slides/slide23.xml><?xml version="1.0" encoding="utf-8"?>
+<p:sld xmlns:a="http://schemas.openxmlformats.org/drawingml/2006/main" xmlns:r="http://schemas.openxmlformats.org/officeDocument/2006/relationships" xmlns:p="http://schemas.openxmlformats.org/presentationml/2006/main">
+  <p:cSld>
+    <p:spTree>
+      <p:nvGrpSpPr>
+        <p:cNvPr id="1" name=""/>
+        <p:cNvGrpSpPr/>
+        <p:nvPr/>
+      </p:nvGrpSpPr>
+      <p:grpSpPr>
+        <a:xfrm>
+          <a:off x="0" y="0"/>
+          <a:ext cx="0" cy="0"/>
+          <a:chOff x="0" y="0"/>
+          <a:chExt cx="0" cy="0"/>
+        </a:xfrm>
+      </p:grpSpPr>
+      <p:sp>
+        <p:nvSpPr>
+          <p:cNvPr id="2" name="Title 1"/>
+          <p:cNvSpPr>
+            <a:spLocks noGrp="1"/>
+          </p:cNvSpPr>
+          <p:nvPr>
+            <p:ph type="title"/>
+          </p:nvPr>
+        </p:nvSpPr>
+        <p:spPr/>
+        <p:txBody>
+          <a:bodyPr/>
+          <a:lstStyle/>
+          <a:p>
+            <a:r>
+              <a:rPr lang="en-US" dirty="0"/>
+              <a:t>Experiment Results—Reservoir</a:t>
+            </a:r>
+          </a:p>
+        </p:txBody>
+      </p:sp>
+      <p:sp>
+        <p:nvSpPr>
+          <p:cNvPr id="3" name="Content Placeholder 2"/>
+          <p:cNvSpPr>
+            <a:spLocks noGrp="1"/>
+          </p:cNvSpPr>
+          <p:nvPr>
+            <p:ph idx="1"/>
+          </p:nvPr>
+        </p:nvSpPr>
+        <p:spPr/>
+        <p:txBody>
+          <a:bodyPr/>
+          <a:lstStyle/>
+          <a:p>
+            <a:r>
+              <a:rPr lang="en-US" dirty="0"/>
+              <a:t>6000 Tweets(Total) Run time: </a:t>
+            </a:r>
+            <a:r>
+              <a:rPr lang="en-US" u="sng" dirty="0"/>
+              <a:t>102.007 seconds</a:t>
+            </a:r>
+          </a:p>
+          <a:p>
+            <a:r>
+              <a:rPr lang="en-US" dirty="0"/>
+              <a:t>1000 Tweet Random Sampling runtime: </a:t>
+            </a:r>
+            <a:r>
+              <a:rPr lang="en-US" u="sng" dirty="0"/>
+              <a:t>118.039 seconds</a:t>
+            </a:r>
+          </a:p>
+          <a:p>
+            <a:r>
+              <a:rPr lang="en-US" dirty="0"/>
+              <a:t>1000 Tweet Reservoir Sampling runtime:</a:t>
+            </a:r>
+            <a:r>
+              <a:rPr lang="en-US" b="1" u="sng" dirty="0">
+                <a:solidFill>
+                  <a:srgbClr val="FF0000"/>
+                </a:solidFill>
+              </a:rPr>
+              <a:t>54.332 seconds</a:t>
+            </a:r>
+          </a:p>
+        </p:txBody>
+      </p:sp>
+    </p:spTree>
+    <p:extLst>
+      <p:ext uri="{BB962C8B-B14F-4D97-AF65-F5344CB8AC3E}">
+        <p14:creationId xmlns:p14="http://schemas.microsoft.com/office/powerpoint/2010/main" val="178975300"/>
+      </p:ext>
+    </p:extLst>
+  </p:cSld>
+  <p:clrMapOvr>
+    <a:masterClrMapping/>
+  </p:clrMapOvr>
+</p:sld>
+</file>
+
+<file path=ppt/slides/slide24.xml><?xml version="1.0" encoding="utf-8"?>
+<p:sld xmlns:a="http://schemas.openxmlformats.org/drawingml/2006/main" xmlns:r="http://schemas.openxmlformats.org/officeDocument/2006/relationships" xmlns:p="http://schemas.openxmlformats.org/presentationml/2006/main">
+  <p:cSld>
+    <p:spTree>
+      <p:nvGrpSpPr>
+        <p:cNvPr id="1" name=""/>
+        <p:cNvGrpSpPr/>
+        <p:nvPr/>
+      </p:nvGrpSpPr>
+      <p:grpSpPr>
+        <a:xfrm>
+          <a:off x="0" y="0"/>
+          <a:ext cx="0" cy="0"/>
+          <a:chOff x="0" y="0"/>
+          <a:chExt cx="0" cy="0"/>
+        </a:xfrm>
+      </p:grpSpPr>
+      <p:sp>
+        <p:nvSpPr>
+          <p:cNvPr id="2" name="Title 1"/>
+          <p:cNvSpPr>
+            <a:spLocks noGrp="1"/>
+          </p:cNvSpPr>
+          <p:nvPr>
+            <p:ph type="title"/>
+          </p:nvPr>
+        </p:nvSpPr>
+        <p:spPr/>
+        <p:txBody>
+          <a:bodyPr/>
+          <a:lstStyle/>
+          <a:p>
+            <a:r>
+              <a:rPr lang="en-US" dirty="0"/>
+              <a:t>Experiment Results—Reservoir</a:t>
+            </a:r>
+          </a:p>
+        </p:txBody>
+      </p:sp>
+      <p:sp>
+        <p:nvSpPr>
+          <p:cNvPr id="3" name="Content Placeholder 2"/>
+          <p:cNvSpPr>
+            <a:spLocks noGrp="1"/>
+          </p:cNvSpPr>
+          <p:nvPr>
+            <p:ph idx="1"/>
+          </p:nvPr>
+        </p:nvSpPr>
+        <p:spPr>
+          <a:xfrm>
+            <a:off x="1097280" y="1845734"/>
+            <a:ext cx="3567661" cy="3982411"/>
+          </a:xfrm>
+        </p:spPr>
+        <p:txBody>
+          <a:bodyPr/>
+          <a:lstStyle/>
+          <a:p>
+            <a:r>
+              <a:rPr lang="en-US" u="sng" dirty="0"/>
+              <a:t>Total versus Reservoir:</a:t>
+            </a:r>
+          </a:p>
+          <a:p>
+            <a:r>
+              <a:rPr lang="en-US" b="1" dirty="0">
+                <a:solidFill>
+                  <a:srgbClr val="FF0000"/>
+                </a:solidFill>
+              </a:rPr>
+              <a:t>0.044179291646% avg. error</a:t>
+            </a:r>
+          </a:p>
+          <a:p>
+            <a:endParaRPr lang="en-US" u="sng" dirty="0"/>
+          </a:p>
+          <a:p>
+            <a:endParaRPr lang="en-US" u="sng" dirty="0"/>
+          </a:p>
+          <a:p>
+            <a:r>
+              <a:rPr lang="en-US" u="sng" dirty="0"/>
+              <a:t>Total versus Random:</a:t>
+            </a:r>
+          </a:p>
+          <a:p>
+            <a:r>
+              <a:rPr lang="en-US" b="1" dirty="0"/>
+              <a:t>0.067820708354% avg. error</a:t>
+            </a:r>
+          </a:p>
+        </p:txBody>
+      </p:sp>
+      <p:pic>
+        <p:nvPicPr>
+          <p:cNvPr id="4" name="Picture 3"/>
+          <p:cNvPicPr>
+            <a:picLocks noChangeAspect="1"/>
+          </p:cNvPicPr>
+          <p:nvPr/>
+        </p:nvPicPr>
+        <p:blipFill>
+          <a:blip r:embed="rId2">
+            <a:extLst>
+              <a:ext uri="{28A0092B-C50C-407E-A947-70E740481C1C}">
+                <a14:useLocalDpi xmlns:a14="http://schemas.microsoft.com/office/drawing/2010/main" val="0"/>
+              </a:ext>
+            </a:extLst>
+          </a:blip>
+          <a:stretch>
+            <a:fillRect/>
+          </a:stretch>
+        </p:blipFill>
+        <p:spPr>
+          <a:xfrm>
+            <a:off x="4664941" y="1737360"/>
+            <a:ext cx="6667500" cy="4286250"/>
+          </a:xfrm>
+          <a:prstGeom prst="rect">
+            <a:avLst/>
+          </a:prstGeom>
+        </p:spPr>
+      </p:pic>
+    </p:spTree>
+    <p:extLst>
+      <p:ext uri="{BB962C8B-B14F-4D97-AF65-F5344CB8AC3E}">
+        <p14:creationId xmlns:p14="http://schemas.microsoft.com/office/powerpoint/2010/main" val="2686140289"/>
+      </p:ext>
+    </p:extLst>
+  </p:cSld>
+  <p:clrMapOvr>
+    <a:masterClrMapping/>
+  </p:clrMapOvr>
+</p:sld>
+</file>
+
+<file path=ppt/slides/slide25.xml><?xml version="1.0" encoding="utf-8"?>
+<p:sld xmlns:a="http://schemas.openxmlformats.org/drawingml/2006/main" xmlns:r="http://schemas.openxmlformats.org/officeDocument/2006/relationships" xmlns:p="http://schemas.openxmlformats.org/presentationml/2006/main">
+  <p:cSld>
+    <p:spTree>
+      <p:nvGrpSpPr>
+        <p:cNvPr id="1" name=""/>
+        <p:cNvGrpSpPr/>
+        <p:nvPr/>
+      </p:nvGrpSpPr>
+      <p:grpSpPr>
+        <a:xfrm>
+          <a:off x="0" y="0"/>
+          <a:ext cx="0" cy="0"/>
+          <a:chOff x="0" y="0"/>
+          <a:chExt cx="0" cy="0"/>
+        </a:xfrm>
+      </p:grpSpPr>
+      <p:sp>
+        <p:nvSpPr>
+          <p:cNvPr id="2" name="Title 1"/>
+          <p:cNvSpPr>
+            <a:spLocks noGrp="1"/>
+          </p:cNvSpPr>
+          <p:nvPr>
+            <p:ph type="title"/>
+          </p:nvPr>
+        </p:nvSpPr>
+        <p:spPr/>
+        <p:txBody>
+          <a:bodyPr/>
+          <a:lstStyle/>
+          <a:p>
+            <a:r>
+              <a:rPr lang="en-US" dirty="0"/>
+              <a:t>Conclusion &amp; Future Work</a:t>
+            </a:r>
+          </a:p>
+        </p:txBody>
+      </p:sp>
+      <p:sp>
+        <p:nvSpPr>
+          <p:cNvPr id="3" name="Content Placeholder 2"/>
+          <p:cNvSpPr>
+            <a:spLocks noGrp="1"/>
+          </p:cNvSpPr>
+          <p:nvPr>
+            <p:ph idx="1"/>
+          </p:nvPr>
+        </p:nvSpPr>
+        <p:spPr/>
+        <p:txBody>
+          <a:bodyPr/>
+          <a:lstStyle/>
+          <a:p>
+            <a:pPr>
+              <a:buFont typeface="Wingdings" panose="05000000000000000000" pitchFamily="2" charset="2"/>
+              <a:buChar char="§"/>
+            </a:pPr>
+            <a:r>
+              <a:rPr lang="en-US" dirty="0"/>
+              <a:t>Have tested two random sampling techniques to improve time of pipeline</a:t>
+            </a:r>
+          </a:p>
+          <a:p>
+            <a:pPr lvl="1">
+              <a:buFont typeface="Wingdings" panose="05000000000000000000" pitchFamily="2" charset="2"/>
+              <a:buChar char="§"/>
+            </a:pPr>
+            <a:r>
+              <a:rPr lang="en-US" dirty="0"/>
+              <a:t>Used random smaller sample to train classifier to decrease time taken while maintaining accuracy—found out larger sample is better than smaller sample (obviously)</a:t>
+            </a:r>
+          </a:p>
+          <a:p>
+            <a:pPr lvl="1">
+              <a:buFont typeface="Wingdings" panose="05000000000000000000" pitchFamily="2" charset="2"/>
+              <a:buChar char="§"/>
+            </a:pPr>
+            <a:r>
+              <a:rPr lang="en-US" dirty="0"/>
+              <a:t>Used reservoir sampling to decrease amount of tweets needed to be kept (save space) as well as save time compared to taking a random sample each time</a:t>
+            </a:r>
+          </a:p>
+          <a:p>
+            <a:pPr>
+              <a:buFont typeface="Wingdings" panose="05000000000000000000" pitchFamily="2" charset="2"/>
+              <a:buChar char="§"/>
+            </a:pPr>
+            <a:r>
+              <a:rPr lang="en-US" dirty="0"/>
+              <a:t>Can be applied to other social media; pull dataset from Yelp, Facebook, etc.</a:t>
+            </a:r>
+          </a:p>
+          <a:p>
+            <a:pPr>
+              <a:buFont typeface="Wingdings" panose="05000000000000000000" pitchFamily="2" charset="2"/>
+              <a:buChar char="§"/>
+            </a:pPr>
+            <a:r>
+              <a:rPr lang="en-US" dirty="0"/>
+              <a:t>Can be used in other political elections or even on approval ratings for bills/propositions</a:t>
+            </a:r>
+          </a:p>
+          <a:p>
+            <a:pPr>
+              <a:buFont typeface="Wingdings" panose="05000000000000000000" pitchFamily="2" charset="2"/>
+              <a:buChar char="§"/>
+            </a:pPr>
+            <a:r>
+              <a:rPr lang="en-US" dirty="0"/>
+              <a:t>Future work</a:t>
+            </a:r>
+          </a:p>
+          <a:p>
+            <a:pPr lvl="1">
+              <a:buFont typeface="Wingdings" panose="05000000000000000000" pitchFamily="2" charset="2"/>
+              <a:buChar char="§"/>
+            </a:pPr>
+            <a:r>
+              <a:rPr lang="en-US" dirty="0"/>
+              <a:t>Apply to Donald Trump Tweets over more time</a:t>
+            </a:r>
+          </a:p>
+          <a:p>
+            <a:pPr lvl="1">
+              <a:buFont typeface="Wingdings" panose="05000000000000000000" pitchFamily="2" charset="2"/>
+              <a:buChar char="§"/>
+            </a:pPr>
+            <a:r>
+              <a:rPr lang="en-US" dirty="0"/>
+              <a:t>Apply to another elected official/candidate</a:t>
+            </a:r>
+          </a:p>
+          <a:p>
+            <a:pPr lvl="1">
+              <a:buFont typeface="Wingdings" panose="05000000000000000000" pitchFamily="2" charset="2"/>
+              <a:buChar char="§"/>
+            </a:pPr>
+            <a:r>
+              <a:rPr lang="en-US" dirty="0"/>
+              <a:t>Change classifier into 3 classes: positive, neutral, negative and retest pipeline and randomization</a:t>
+            </a:r>
+          </a:p>
+        </p:txBody>
+      </p:sp>
+    </p:spTree>
+    <p:extLst>
+      <p:ext uri="{BB962C8B-B14F-4D97-AF65-F5344CB8AC3E}">
+        <p14:creationId xmlns:p14="http://schemas.microsoft.com/office/powerpoint/2010/main" val="4095451030"/>
+      </p:ext>
+    </p:extLst>
+  </p:cSld>
+  <p:clrMapOvr>
+    <a:masterClrMapping/>
+  </p:clrMapOvr>
+</p:sld>
+</file>
+
+<file path=ppt/slides/slide26.xml><?xml version="1.0" encoding="utf-8"?>
+<p:sld xmlns:a="http://schemas.openxmlformats.org/drawingml/2006/main" xmlns:r="http://schemas.openxmlformats.org/officeDocument/2006/relationships" xmlns:p="http://schemas.openxmlformats.org/presentationml/2006/main">
+  <p:cSld>
+    <p:spTree>
+      <p:nvGrpSpPr>
+        <p:cNvPr id="1" name=""/>
+        <p:cNvGrpSpPr/>
+        <p:nvPr/>
+      </p:nvGrpSpPr>
+      <p:grpSpPr>
+        <a:xfrm>
+          <a:off x="0" y="0"/>
+          <a:ext cx="0" cy="0"/>
+          <a:chOff x="0" y="0"/>
+          <a:chExt cx="0" cy="0"/>
+        </a:xfrm>
+      </p:grpSpPr>
+      <p:sp>
+        <p:nvSpPr>
+          <p:cNvPr id="2" name="Title 1"/>
+          <p:cNvSpPr>
+            <a:spLocks noGrp="1"/>
+          </p:cNvSpPr>
+          <p:nvPr>
+            <p:ph type="title"/>
+          </p:nvPr>
+        </p:nvSpPr>
+        <p:spPr/>
+        <p:txBody>
+          <a:bodyPr/>
+          <a:lstStyle/>
+          <a:p>
+            <a:r>
+              <a:rPr lang="en-US" dirty="0"/>
               <a:t>References</a:t>
             </a:r>
           </a:p>
@@ -6116,7 +9017,7 @@
         <p:spPr/>
         <p:txBody>
           <a:bodyPr>
-            <a:normAutofit fontScale="77500" lnSpcReduction="20000"/>
+            <a:normAutofit fontScale="70000" lnSpcReduction="20000"/>
           </a:bodyPr>
           <a:lstStyle/>
           <a:p>
@@ -6334,13 +9235,22 @@
             <a:pPr marL="0" indent="0">
               <a:buNone/>
             </a:pPr>
-            <a:endParaRPr lang="en-US" dirty="0"/>
-          </a:p>
-          <a:p>
-            <a:pPr>
-              <a:buFont typeface="Wingdings" panose="05000000000000000000" pitchFamily="2" charset="2"/>
-              <a:buChar char="§"/>
-            </a:pPr>
+            <a:r>
+              <a:rPr lang="en-US" dirty="0"/>
+              <a:t>Code: </a:t>
+            </a:r>
+            <a:r>
+              <a:rPr lang="en-US" dirty="0">
+                <a:hlinkClick r:id="rId9"/>
+              </a:rPr>
+              <a:t>https://github.com/denniseh7</a:t>
+            </a:r>
+            <a:r>
+              <a:rPr lang="en-US">
+                <a:hlinkClick r:id="rId9"/>
+              </a:rPr>
+              <a:t>/CS262</a:t>
+            </a:r>
             <a:endParaRPr lang="en-US" dirty="0"/>
           </a:p>
         </p:txBody>

</xml_diff>